<commit_message>
Informe de avance semana 2
</commit_message>
<xml_diff>
--- a/Monitoreo_Proyecto.pptx
+++ b/Monitoreo_Proyecto.pptx
@@ -230,7 +230,7 @@
           <a:p>
             <a:fld id="{EC13577B-6902-467D-A26C-08A0DD5E4E03}" type="datetimeFigureOut">
               <a:rPr lang="en-US" smtClean="0"/>
-              <a:t>9/6/2020</a:t>
+              <a:t>9/13/2020</a:t>
             </a:fld>
             <a:endParaRPr lang="en-US" dirty="0"/>
           </a:p>
@@ -793,7 +793,7 @@
           <a:p>
             <a:fld id="{04AD7083-2812-4336-A862-6CB4E9DAA666}" type="datetime1">
               <a:rPr lang="en-US" smtClean="0"/>
-              <a:t>9/6/2020</a:t>
+              <a:t>9/13/2020</a:t>
             </a:fld>
             <a:endParaRPr lang="en-US" dirty="0"/>
           </a:p>
@@ -1070,7 +1070,7 @@
           <a:p>
             <a:fld id="{F426DB13-0979-4AFD-BE5D-BA943E81C2FF}" type="datetime1">
               <a:rPr lang="en-US" smtClean="0"/>
-              <a:t>9/6/2020</a:t>
+              <a:t>9/13/2020</a:t>
             </a:fld>
             <a:endParaRPr lang="en-US" dirty="0"/>
           </a:p>
@@ -1352,7 +1352,7 @@
           <a:p>
             <a:fld id="{ACA095C1-F76B-4592-A3BF-48B4D1BF64A5}" type="datetime1">
               <a:rPr lang="en-US" smtClean="0"/>
-              <a:t>9/6/2020</a:t>
+              <a:t>9/13/2020</a:t>
             </a:fld>
             <a:endParaRPr lang="en-US" dirty="0"/>
           </a:p>
@@ -1713,7 +1713,7 @@
           <a:p>
             <a:fld id="{F68BAF15-D946-438F-BA57-43A568DB52D7}" type="datetime1">
               <a:rPr lang="en-US" smtClean="0"/>
-              <a:t>9/6/2020</a:t>
+              <a:t>9/13/2020</a:t>
             </a:fld>
             <a:endParaRPr lang="en-US" dirty="0"/>
           </a:p>
@@ -2013,7 +2013,7 @@
           <a:p>
             <a:fld id="{635A5B98-0E43-43A4-8C2A-E00A6A883A04}" type="datetime1">
               <a:rPr lang="en-US" smtClean="0"/>
-              <a:t>9/6/2020</a:t>
+              <a:t>9/13/2020</a:t>
             </a:fld>
             <a:endParaRPr lang="en-US" dirty="0"/>
           </a:p>
@@ -2528,7 +2528,7 @@
           <a:p>
             <a:fld id="{45FB536E-04DA-42C8-BC01-49FDB8623C5B}" type="datetime1">
               <a:rPr lang="en-US" smtClean="0"/>
-              <a:t>9/6/2020</a:t>
+              <a:t>9/13/2020</a:t>
             </a:fld>
             <a:endParaRPr lang="en-US" dirty="0"/>
           </a:p>
@@ -3173,7 +3173,7 @@
           <a:p>
             <a:fld id="{EE38660A-ACB5-4EAE-A29D-584DB55BAC5B}" type="datetime1">
               <a:rPr lang="en-US" smtClean="0"/>
-              <a:t>9/6/2020</a:t>
+              <a:t>9/13/2020</a:t>
             </a:fld>
             <a:endParaRPr lang="en-US" dirty="0"/>
           </a:p>
@@ -3398,7 +3398,7 @@
           <a:p>
             <a:fld id="{68130BA2-7F47-4355-A40B-1D4E78D026D1}" type="datetime1">
               <a:rPr lang="en-US" smtClean="0"/>
-              <a:t>9/6/2020</a:t>
+              <a:t>9/13/2020</a:t>
             </a:fld>
             <a:endParaRPr lang="en-US" dirty="0"/>
           </a:p>
@@ -3539,7 +3539,7 @@
           <a:p>
             <a:fld id="{0C7FF9F2-B4E6-461D-80C5-31D1DFDBE4F3}" type="datetime1">
               <a:rPr lang="en-US" smtClean="0"/>
-              <a:t>9/6/2020</a:t>
+              <a:t>9/13/2020</a:t>
             </a:fld>
             <a:endParaRPr lang="en-US" dirty="0"/>
           </a:p>
@@ -3876,7 +3876,7 @@
           <a:p>
             <a:fld id="{338DC08D-1485-4CDD-BD12-A2AAA137B289}" type="datetime1">
               <a:rPr lang="en-US" smtClean="0"/>
-              <a:t>9/6/2020</a:t>
+              <a:t>9/13/2020</a:t>
             </a:fld>
             <a:endParaRPr lang="en-US" dirty="0"/>
           </a:p>
@@ -4133,7 +4133,7 @@
           <a:p>
             <a:fld id="{13D2B1DD-5C24-46B3-BEAE-43189A8FCAFF}" type="datetime1">
               <a:rPr lang="en-US" smtClean="0"/>
-              <a:t>9/6/2020</a:t>
+              <a:t>9/13/2020</a:t>
             </a:fld>
             <a:endParaRPr lang="en-US" dirty="0"/>
           </a:p>
@@ -4346,7 +4346,7 @@
           <a:p>
             <a:fld id="{565BA3BC-6560-4C09-A047-A8DF1A0DE359}" type="datetime1">
               <a:rPr lang="en-US" smtClean="0"/>
-              <a:t>9/6/2020</a:t>
+              <a:t>9/13/2020</a:t>
             </a:fld>
             <a:endParaRPr lang="en-US" dirty="0"/>
           </a:p>
@@ -5423,7 +5423,7 @@
             </a:r>
             <a:r>
               <a:rPr lang="es-419" b="1" dirty="0"/>
-              <a:t> Semana  1</a:t>
+              <a:t> Semana  2</a:t>
             </a:r>
           </a:p>
         </p:txBody>
@@ -7177,8 +7177,8 @@
         </p:nvSpPr>
         <p:spPr>
           <a:xfrm>
-            <a:off x="1378578" y="1479439"/>
-            <a:ext cx="7723050" cy="665133"/>
+            <a:off x="1199469" y="1482456"/>
+            <a:ext cx="1647426" cy="726077"/>
           </a:xfrm>
           <a:prstGeom prst="roundRect">
             <a:avLst/>
@@ -7215,14 +7215,14 @@
               <a:buChar char="•"/>
             </a:pPr>
             <a:r>
-              <a:rPr lang="es-MX" sz="1400" dirty="0">
+              <a:rPr lang="es-MX" sz="800" dirty="0">
                 <a:solidFill>
                   <a:schemeClr val="tx1"/>
                 </a:solidFill>
               </a:rPr>
               <a:t>(2)Como administrador quiero crear un post para publicar una noticia.</a:t>
             </a:r>
-            <a:endParaRPr lang="es-419" sz="1400" dirty="0">
+            <a:endParaRPr lang="es-419" sz="800" dirty="0">
               <a:solidFill>
                 <a:schemeClr val="tx1"/>
               </a:solidFill>
@@ -7232,10 +7232,10 @@
       </p:sp>
       <p:sp>
         <p:nvSpPr>
-          <p:cNvPr id="21" name="Rectángulo redondeado 13">
+          <p:cNvPr id="28" name="Flecha: a la derecha 27">
             <a:extLst>
               <a:ext uri="{FF2B5EF4-FFF2-40B4-BE49-F238E27FC236}">
-                <a16:creationId xmlns:a16="http://schemas.microsoft.com/office/drawing/2014/main" id="{B372958D-487C-49F4-A343-49D14943988B}"/>
+                <a16:creationId xmlns:a16="http://schemas.microsoft.com/office/drawing/2014/main" id="{55C74F92-0B15-4A15-8016-8E0992B3ED99}"/>
               </a:ext>
             </a:extLst>
           </p:cNvPr>
@@ -7244,18 +7244,12 @@
         </p:nvSpPr>
         <p:spPr>
           <a:xfrm>
-            <a:off x="7467597" y="4886708"/>
-            <a:ext cx="1836659" cy="665134"/>
-          </a:xfrm>
-          <a:prstGeom prst="roundRect">
+            <a:off x="22098" y="1627196"/>
+            <a:ext cx="689289" cy="436596"/>
+          </a:xfrm>
+          <a:prstGeom prst="rightArrow">
             <a:avLst/>
           </a:prstGeom>
-          <a:solidFill>
-            <a:schemeClr val="accent6">
-              <a:lumMod val="60000"/>
-              <a:lumOff val="40000"/>
-            </a:schemeClr>
-          </a:solidFill>
         </p:spPr>
         <p:style>
           <a:lnRef idx="2">
@@ -7277,32 +7271,21 @@
           <a:bodyPr rtlCol="0" anchor="ctr"/>
           <a:lstStyle/>
           <a:p>
-            <a:pPr marL="285750" indent="-285750">
-              <a:buFont typeface="Arial" panose="020B0604020202020204" pitchFamily="34" charset="0"/>
-              <a:buChar char="•"/>
-            </a:pPr>
-            <a:r>
-              <a:rPr lang="es-MX" sz="1000" dirty="0">
-                <a:solidFill>
-                  <a:schemeClr val="tx1"/>
-                </a:solidFill>
-              </a:rPr>
-              <a:t>(3)Como usuario quiero usar mis credenciales para ingresar al sistema.</a:t>
-            </a:r>
-            <a:endParaRPr lang="es-419" sz="1000" dirty="0">
-              <a:solidFill>
-                <a:schemeClr val="tx1"/>
-              </a:solidFill>
-            </a:endParaRPr>
-          </a:p>
-        </p:txBody>
-      </p:sp>
-      <p:sp>
-        <p:nvSpPr>
-          <p:cNvPr id="27" name="Rectángulo redondeado 13">
+            <a:pPr algn="ctr"/>
+            <a:r>
+              <a:rPr lang="es-MX" dirty="0"/>
+              <a:t>10</a:t>
+            </a:r>
+            <a:endParaRPr lang="es-CL" dirty="0"/>
+          </a:p>
+        </p:txBody>
+      </p:sp>
+      <p:sp>
+        <p:nvSpPr>
+          <p:cNvPr id="3" name="Rectángulo redondeado 13">
             <a:extLst>
               <a:ext uri="{FF2B5EF4-FFF2-40B4-BE49-F238E27FC236}">
-                <a16:creationId xmlns:a16="http://schemas.microsoft.com/office/drawing/2014/main" id="{C5CC36CF-9ECB-41E0-93E7-978685E128EB}"/>
+                <a16:creationId xmlns:a16="http://schemas.microsoft.com/office/drawing/2014/main" id="{0D167CC2-3B85-4CA3-BEC6-A2DAF64D32E6}"/>
               </a:ext>
             </a:extLst>
           </p:cNvPr>
@@ -7311,8 +7294,8 @@
         </p:nvSpPr>
         <p:spPr>
           <a:xfrm>
-            <a:off x="3410893" y="2483177"/>
-            <a:ext cx="2254616" cy="682720"/>
+            <a:off x="1199469" y="2424435"/>
+            <a:ext cx="1647426" cy="726077"/>
           </a:xfrm>
           <a:prstGeom prst="roundRect">
             <a:avLst/>
@@ -7349,14 +7332,14 @@
               <a:buChar char="•"/>
             </a:pPr>
             <a:r>
-              <a:rPr lang="es-MX" sz="1000" dirty="0">
+              <a:rPr lang="es-MX" sz="800" dirty="0">
                 <a:solidFill>
                   <a:schemeClr val="tx1"/>
                 </a:solidFill>
               </a:rPr>
-              <a:t>(3)Como usuario quiero ver los post ordenados por fecha para poder leer noticias.</a:t>
-            </a:r>
-            <a:endParaRPr lang="es-419" sz="1000" dirty="0">
+              <a:t>(3) Como administrador quiero usar mis credenciales para ingresar al sistema.</a:t>
+            </a:r>
+            <a:endParaRPr lang="es-419" sz="800" dirty="0">
               <a:solidFill>
                 <a:schemeClr val="tx1"/>
               </a:solidFill>
@@ -7366,10 +7349,10 @@
       </p:sp>
       <p:sp>
         <p:nvSpPr>
-          <p:cNvPr id="25" name="Rectángulo redondeado 13">
+          <p:cNvPr id="5" name="Rectángulo redondeado 13">
             <a:extLst>
               <a:ext uri="{FF2B5EF4-FFF2-40B4-BE49-F238E27FC236}">
-                <a16:creationId xmlns:a16="http://schemas.microsoft.com/office/drawing/2014/main" id="{F947E2E7-9AF6-4440-B5DE-8B1246456420}"/>
+                <a16:creationId xmlns:a16="http://schemas.microsoft.com/office/drawing/2014/main" id="{B6E6421E-631E-499F-B2C4-FEAEA70908E3}"/>
               </a:ext>
             </a:extLst>
           </p:cNvPr>
@@ -7378,8 +7361,8 @@
         </p:nvSpPr>
         <p:spPr>
           <a:xfrm>
-            <a:off x="3410893" y="3165897"/>
-            <a:ext cx="2254616" cy="790013"/>
+            <a:off x="1149632" y="3398027"/>
+            <a:ext cx="1697264" cy="856492"/>
           </a:xfrm>
           <a:prstGeom prst="roundRect">
             <a:avLst/>
@@ -7416,14 +7399,14 @@
               <a:buChar char="•"/>
             </a:pPr>
             <a:r>
-              <a:rPr lang="es-MX" sz="1000" dirty="0">
+              <a:rPr lang="es-MX" sz="800" dirty="0">
                 <a:solidFill>
                   <a:schemeClr val="tx1"/>
                 </a:solidFill>
               </a:rPr>
-              <a:t>(3)Como usuario quiero visualizar cada uno de los post y poder visitarlos para poder ver la noticia en detalle.</a:t>
-            </a:r>
-            <a:endParaRPr lang="es-419" sz="1000" dirty="0">
+              <a:t>(3) Como administrador quiero ser redirigido a la vista de administradores para poder acceder a mis funciones de administrador</a:t>
+            </a:r>
+            <a:endParaRPr lang="es-419" sz="800" dirty="0">
               <a:solidFill>
                 <a:schemeClr val="tx1"/>
               </a:solidFill>
@@ -7433,10 +7416,10 @@
       </p:sp>
       <p:sp>
         <p:nvSpPr>
-          <p:cNvPr id="23" name="Rectángulo redondeado 13">
+          <p:cNvPr id="6" name="Rectángulo redondeado 13">
             <a:extLst>
               <a:ext uri="{FF2B5EF4-FFF2-40B4-BE49-F238E27FC236}">
-                <a16:creationId xmlns:a16="http://schemas.microsoft.com/office/drawing/2014/main" id="{19640281-A313-4C4D-B04E-C3CBDF7B4524}"/>
+                <a16:creationId xmlns:a16="http://schemas.microsoft.com/office/drawing/2014/main" id="{774C1C39-DBF5-4892-AA64-BBD1B90314F5}"/>
               </a:ext>
             </a:extLst>
           </p:cNvPr>
@@ -7445,8 +7428,8 @@
         </p:nvSpPr>
         <p:spPr>
           <a:xfrm>
-            <a:off x="3410893" y="3981651"/>
-            <a:ext cx="2028352" cy="679621"/>
+            <a:off x="1149631" y="4536408"/>
+            <a:ext cx="1697264" cy="839136"/>
           </a:xfrm>
           <a:prstGeom prst="roundRect">
             <a:avLst/>
@@ -7483,251 +7466,29 @@
               <a:buChar char="•"/>
             </a:pPr>
             <a:r>
-              <a:rPr lang="es-MX" sz="1000" dirty="0">
+              <a:rPr lang="es-MX" sz="800" dirty="0">
                 <a:solidFill>
                   <a:schemeClr val="tx1"/>
                 </a:solidFill>
               </a:rPr>
-              <a:t>(1)Como usuario una vez dentro de un post quiero salir de ese post, para poder visitar otro.</a:t>
-            </a:r>
-          </a:p>
-        </p:txBody>
-      </p:sp>
-      <p:sp>
-        <p:nvSpPr>
-          <p:cNvPr id="28" name="Flecha: a la derecha 27">
-            <a:extLst>
-              <a:ext uri="{FF2B5EF4-FFF2-40B4-BE49-F238E27FC236}">
-                <a16:creationId xmlns:a16="http://schemas.microsoft.com/office/drawing/2014/main" id="{55C74F92-0B15-4A15-8016-8E0992B3ED99}"/>
-              </a:ext>
-            </a:extLst>
-          </p:cNvPr>
-          <p:cNvSpPr/>
-          <p:nvPr/>
-        </p:nvSpPr>
-        <p:spPr>
-          <a:xfrm>
-            <a:off x="19303" y="1771937"/>
-            <a:ext cx="689289" cy="436596"/>
-          </a:xfrm>
-          <a:prstGeom prst="rightArrow">
-            <a:avLst/>
-          </a:prstGeom>
-        </p:spPr>
-        <p:style>
-          <a:lnRef idx="2">
-            <a:schemeClr val="accent1">
-              <a:shade val="50000"/>
-            </a:schemeClr>
-          </a:lnRef>
-          <a:fillRef idx="1">
-            <a:schemeClr val="accent1"/>
-          </a:fillRef>
-          <a:effectRef idx="0">
-            <a:schemeClr val="accent1"/>
-          </a:effectRef>
-          <a:fontRef idx="minor">
-            <a:schemeClr val="lt1"/>
-          </a:fontRef>
-        </p:style>
-        <p:txBody>
-          <a:bodyPr rtlCol="0" anchor="ctr"/>
-          <a:lstStyle/>
-          <a:p>
-            <a:pPr algn="ctr"/>
-            <a:r>
-              <a:rPr lang="es-MX" dirty="0"/>
-              <a:t>12</a:t>
-            </a:r>
-            <a:endParaRPr lang="es-CL" dirty="0"/>
-          </a:p>
-        </p:txBody>
-      </p:sp>
-      <p:sp>
-        <p:nvSpPr>
-          <p:cNvPr id="30" name="Flecha: a la derecha 29">
-            <a:extLst>
-              <a:ext uri="{FF2B5EF4-FFF2-40B4-BE49-F238E27FC236}">
-                <a16:creationId xmlns:a16="http://schemas.microsoft.com/office/drawing/2014/main" id="{B8AD0828-7423-4908-8F54-3F2547545548}"/>
-              </a:ext>
-            </a:extLst>
-          </p:cNvPr>
-          <p:cNvSpPr/>
-          <p:nvPr/>
-        </p:nvSpPr>
-        <p:spPr>
-          <a:xfrm>
-            <a:off x="0" y="2523646"/>
-            <a:ext cx="689289" cy="436596"/>
-          </a:xfrm>
-          <a:prstGeom prst="rightArrow">
-            <a:avLst/>
-          </a:prstGeom>
-        </p:spPr>
-        <p:style>
-          <a:lnRef idx="2">
-            <a:schemeClr val="accent1">
-              <a:shade val="50000"/>
-            </a:schemeClr>
-          </a:lnRef>
-          <a:fillRef idx="1">
-            <a:schemeClr val="accent1"/>
-          </a:fillRef>
-          <a:effectRef idx="0">
-            <a:schemeClr val="accent1"/>
-          </a:effectRef>
-          <a:fontRef idx="minor">
-            <a:schemeClr val="lt1"/>
-          </a:fontRef>
-        </p:style>
-        <p:txBody>
-          <a:bodyPr rtlCol="0" anchor="ctr"/>
-          <a:lstStyle/>
-          <a:p>
-            <a:pPr algn="ctr"/>
-            <a:r>
-              <a:rPr lang="es-MX" dirty="0"/>
-              <a:t>5</a:t>
-            </a:r>
-            <a:endParaRPr lang="es-CL" dirty="0"/>
-          </a:p>
-        </p:txBody>
-      </p:sp>
-      <p:sp>
-        <p:nvSpPr>
-          <p:cNvPr id="32" name="Flecha: a la derecha 31">
-            <a:extLst>
-              <a:ext uri="{FF2B5EF4-FFF2-40B4-BE49-F238E27FC236}">
-                <a16:creationId xmlns:a16="http://schemas.microsoft.com/office/drawing/2014/main" id="{8CB0DFCA-55F8-4D6A-9443-D47844CA9CAC}"/>
-              </a:ext>
-            </a:extLst>
-          </p:cNvPr>
-          <p:cNvSpPr/>
-          <p:nvPr/>
-        </p:nvSpPr>
-        <p:spPr>
-          <a:xfrm>
-            <a:off x="19303" y="5000977"/>
-            <a:ext cx="689289" cy="436596"/>
-          </a:xfrm>
-          <a:prstGeom prst="rightArrow">
-            <a:avLst/>
-          </a:prstGeom>
-        </p:spPr>
-        <p:style>
-          <a:lnRef idx="2">
-            <a:schemeClr val="accent1">
-              <a:shade val="50000"/>
-            </a:schemeClr>
-          </a:lnRef>
-          <a:fillRef idx="1">
-            <a:schemeClr val="accent1"/>
-          </a:fillRef>
-          <a:effectRef idx="0">
-            <a:schemeClr val="accent1"/>
-          </a:effectRef>
-          <a:fontRef idx="minor">
-            <a:schemeClr val="lt1"/>
-          </a:fontRef>
-        </p:style>
-        <p:txBody>
-          <a:bodyPr rtlCol="0" anchor="ctr"/>
-          <a:lstStyle/>
-          <a:p>
-            <a:pPr algn="ctr"/>
-            <a:r>
-              <a:rPr lang="es-MX" dirty="0"/>
-              <a:t>2</a:t>
-            </a:r>
-            <a:endParaRPr lang="es-CL" dirty="0"/>
-          </a:p>
-        </p:txBody>
-      </p:sp>
-      <p:cxnSp>
-        <p:nvCxnSpPr>
-          <p:cNvPr id="34" name="Conector recto de flecha 33">
-            <a:extLst>
-              <a:ext uri="{FF2B5EF4-FFF2-40B4-BE49-F238E27FC236}">
-                <a16:creationId xmlns:a16="http://schemas.microsoft.com/office/drawing/2014/main" id="{DA29FEFE-BF60-435B-940C-BB43A793AD24}"/>
-              </a:ext>
-            </a:extLst>
-          </p:cNvPr>
-          <p:cNvCxnSpPr>
-            <a:cxnSpLocks/>
-            <a:stCxn id="28" idx="3"/>
-            <a:endCxn id="27" idx="1"/>
-          </p:cNvCxnSpPr>
-          <p:nvPr/>
-        </p:nvCxnSpPr>
-        <p:spPr>
-          <a:xfrm>
-            <a:off x="708592" y="1990235"/>
-            <a:ext cx="2702301" cy="834302"/>
-          </a:xfrm>
-          <a:prstGeom prst="straightConnector1">
-            <a:avLst/>
-          </a:prstGeom>
-          <a:ln>
-            <a:tailEnd type="triangle"/>
-          </a:ln>
-        </p:spPr>
-        <p:style>
-          <a:lnRef idx="1">
-            <a:schemeClr val="accent1"/>
-          </a:lnRef>
-          <a:fillRef idx="0">
-            <a:schemeClr val="accent1"/>
-          </a:fillRef>
-          <a:effectRef idx="0">
-            <a:schemeClr val="accent1"/>
-          </a:effectRef>
-          <a:fontRef idx="minor">
-            <a:schemeClr val="tx1"/>
-          </a:fontRef>
-        </p:style>
-      </p:cxnSp>
-      <p:cxnSp>
-        <p:nvCxnSpPr>
-          <p:cNvPr id="37" name="Conector recto de flecha 36">
-            <a:extLst>
-              <a:ext uri="{FF2B5EF4-FFF2-40B4-BE49-F238E27FC236}">
-                <a16:creationId xmlns:a16="http://schemas.microsoft.com/office/drawing/2014/main" id="{A01BE9A4-C71E-4A41-ADEA-E044743D42FB}"/>
-              </a:ext>
-            </a:extLst>
-          </p:cNvPr>
-          <p:cNvCxnSpPr>
-            <a:stCxn id="23" idx="3"/>
-            <a:endCxn id="21" idx="1"/>
-          </p:cNvCxnSpPr>
-          <p:nvPr/>
-        </p:nvCxnSpPr>
-        <p:spPr>
-          <a:xfrm>
-            <a:off x="5439245" y="4321462"/>
-            <a:ext cx="2028352" cy="897813"/>
-          </a:xfrm>
-          <a:prstGeom prst="straightConnector1">
-            <a:avLst/>
-          </a:prstGeom>
-          <a:ln>
-            <a:tailEnd type="triangle"/>
-          </a:ln>
-        </p:spPr>
-        <p:style>
-          <a:lnRef idx="1">
-            <a:schemeClr val="accent1"/>
-          </a:lnRef>
-          <a:fillRef idx="0">
-            <a:schemeClr val="accent1"/>
-          </a:fillRef>
-          <a:effectRef idx="0">
-            <a:schemeClr val="accent1"/>
-          </a:effectRef>
-          <a:fontRef idx="minor">
-            <a:schemeClr val="tx1"/>
-          </a:fontRef>
-        </p:style>
-      </p:cxnSp>
+              <a:t>(2)</a:t>
+            </a:r>
+            <a:r>
+              <a:rPr lang="es-419" sz="800" dirty="0">
+                <a:solidFill>
+                  <a:schemeClr val="tx1"/>
+                </a:solidFill>
+              </a:rPr>
+              <a:t> Como administrador quiero crear un post para publicar una noticia</a:t>
+            </a:r>
+            <a:endParaRPr lang="es-MX" sz="800" dirty="0">
+              <a:solidFill>
+                <a:schemeClr val="tx1"/>
+              </a:solidFill>
+            </a:endParaRPr>
+          </a:p>
+        </p:txBody>
+      </p:sp>
     </p:spTree>
     <p:extLst>
       <p:ext uri="{BB962C8B-B14F-4D97-AF65-F5344CB8AC3E}">

</xml_diff>

<commit_message>
Se añadieron los roles en el sistema
</commit_message>
<xml_diff>
--- a/Monitoreo_Proyecto.pptx
+++ b/Monitoreo_Proyecto.pptx
@@ -230,7 +230,7 @@
           <a:p>
             <a:fld id="{EC13577B-6902-467D-A26C-08A0DD5E4E03}" type="datetimeFigureOut">
               <a:rPr lang="en-US" smtClean="0"/>
-              <a:t>9/13/2020</a:t>
+              <a:t>10/4/2020</a:t>
             </a:fld>
             <a:endParaRPr lang="en-US" dirty="0"/>
           </a:p>
@@ -793,7 +793,7 @@
           <a:p>
             <a:fld id="{04AD7083-2812-4336-A862-6CB4E9DAA666}" type="datetime1">
               <a:rPr lang="en-US" smtClean="0"/>
-              <a:t>9/13/2020</a:t>
+              <a:t>10/4/2020</a:t>
             </a:fld>
             <a:endParaRPr lang="en-US" dirty="0"/>
           </a:p>
@@ -1070,7 +1070,7 @@
           <a:p>
             <a:fld id="{F426DB13-0979-4AFD-BE5D-BA943E81C2FF}" type="datetime1">
               <a:rPr lang="en-US" smtClean="0"/>
-              <a:t>9/13/2020</a:t>
+              <a:t>10/4/2020</a:t>
             </a:fld>
             <a:endParaRPr lang="en-US" dirty="0"/>
           </a:p>
@@ -1352,7 +1352,7 @@
           <a:p>
             <a:fld id="{ACA095C1-F76B-4592-A3BF-48B4D1BF64A5}" type="datetime1">
               <a:rPr lang="en-US" smtClean="0"/>
-              <a:t>9/13/2020</a:t>
+              <a:t>10/4/2020</a:t>
             </a:fld>
             <a:endParaRPr lang="en-US" dirty="0"/>
           </a:p>
@@ -1713,7 +1713,7 @@
           <a:p>
             <a:fld id="{F68BAF15-D946-438F-BA57-43A568DB52D7}" type="datetime1">
               <a:rPr lang="en-US" smtClean="0"/>
-              <a:t>9/13/2020</a:t>
+              <a:t>10/4/2020</a:t>
             </a:fld>
             <a:endParaRPr lang="en-US" dirty="0"/>
           </a:p>
@@ -2013,7 +2013,7 @@
           <a:p>
             <a:fld id="{635A5B98-0E43-43A4-8C2A-E00A6A883A04}" type="datetime1">
               <a:rPr lang="en-US" smtClean="0"/>
-              <a:t>9/13/2020</a:t>
+              <a:t>10/4/2020</a:t>
             </a:fld>
             <a:endParaRPr lang="en-US" dirty="0"/>
           </a:p>
@@ -2528,7 +2528,7 @@
           <a:p>
             <a:fld id="{45FB536E-04DA-42C8-BC01-49FDB8623C5B}" type="datetime1">
               <a:rPr lang="en-US" smtClean="0"/>
-              <a:t>9/13/2020</a:t>
+              <a:t>10/4/2020</a:t>
             </a:fld>
             <a:endParaRPr lang="en-US" dirty="0"/>
           </a:p>
@@ -3173,7 +3173,7 @@
           <a:p>
             <a:fld id="{EE38660A-ACB5-4EAE-A29D-584DB55BAC5B}" type="datetime1">
               <a:rPr lang="en-US" smtClean="0"/>
-              <a:t>9/13/2020</a:t>
+              <a:t>10/4/2020</a:t>
             </a:fld>
             <a:endParaRPr lang="en-US" dirty="0"/>
           </a:p>
@@ -3398,7 +3398,7 @@
           <a:p>
             <a:fld id="{68130BA2-7F47-4355-A40B-1D4E78D026D1}" type="datetime1">
               <a:rPr lang="en-US" smtClean="0"/>
-              <a:t>9/13/2020</a:t>
+              <a:t>10/4/2020</a:t>
             </a:fld>
             <a:endParaRPr lang="en-US" dirty="0"/>
           </a:p>
@@ -3539,7 +3539,7 @@
           <a:p>
             <a:fld id="{0C7FF9F2-B4E6-461D-80C5-31D1DFDBE4F3}" type="datetime1">
               <a:rPr lang="en-US" smtClean="0"/>
-              <a:t>9/13/2020</a:t>
+              <a:t>10/4/2020</a:t>
             </a:fld>
             <a:endParaRPr lang="en-US" dirty="0"/>
           </a:p>
@@ -3876,7 +3876,7 @@
           <a:p>
             <a:fld id="{338DC08D-1485-4CDD-BD12-A2AAA137B289}" type="datetime1">
               <a:rPr lang="en-US" smtClean="0"/>
-              <a:t>9/13/2020</a:t>
+              <a:t>10/4/2020</a:t>
             </a:fld>
             <a:endParaRPr lang="en-US" dirty="0"/>
           </a:p>
@@ -4133,7 +4133,7 @@
           <a:p>
             <a:fld id="{13D2B1DD-5C24-46B3-BEAE-43189A8FCAFF}" type="datetime1">
               <a:rPr lang="en-US" smtClean="0"/>
-              <a:t>9/13/2020</a:t>
+              <a:t>10/4/2020</a:t>
             </a:fld>
             <a:endParaRPr lang="en-US" dirty="0"/>
           </a:p>
@@ -4346,7 +4346,7 @@
           <a:p>
             <a:fld id="{565BA3BC-6560-4C09-A047-A8DF1A0DE359}" type="datetime1">
               <a:rPr lang="en-US" smtClean="0"/>
-              <a:t>9/13/2020</a:t>
+              <a:t>10/4/2020</a:t>
             </a:fld>
             <a:endParaRPr lang="en-US" dirty="0"/>
           </a:p>
@@ -5617,7 +5617,7 @@
                   <a:schemeClr val="tx1"/>
                 </a:solidFill>
               </a:rPr>
-              <a:t>Historias no iniciadas: 10</a:t>
+              <a:t>Historias no iniciadas: 8</a:t>
             </a:r>
           </a:p>
           <a:p>
@@ -5681,7 +5681,7 @@
                   <a:schemeClr val="tx1"/>
                 </a:solidFill>
               </a:rPr>
-              <a:t>Historia iniciadas: 11</a:t>
+              <a:t>Historia iniciadas: 15</a:t>
             </a:r>
           </a:p>
           <a:p>
@@ -5759,7 +5759,7 @@
                   <a:schemeClr val="tx1"/>
                 </a:solidFill>
               </a:rPr>
-              <a:t>Historias terminadas: 4</a:t>
+              <a:t>Historias terminadas: 11</a:t>
             </a:r>
           </a:p>
           <a:p>
@@ -5783,7 +5783,7 @@
         </p:nvSpPr>
         <p:spPr>
           <a:xfrm>
-            <a:off x="7424895" y="3771934"/>
+            <a:off x="7229114" y="3588672"/>
             <a:ext cx="2474856" cy="1041453"/>
           </a:xfrm>
           <a:prstGeom prst="roundRect">
@@ -5862,8 +5862,8 @@
         </p:nvCxnSpPr>
         <p:spPr>
           <a:xfrm flipV="1">
-            <a:off x="7010399" y="4292661"/>
-            <a:ext cx="414496" cy="1"/>
+            <a:off x="7010399" y="4109399"/>
+            <a:ext cx="218715" cy="183263"/>
           </a:xfrm>
           <a:prstGeom prst="straightConnector1">
             <a:avLst/>
@@ -5899,8 +5899,8 @@
         </p:nvCxnSpPr>
         <p:spPr>
           <a:xfrm flipV="1">
-            <a:off x="7010399" y="3070681"/>
-            <a:ext cx="414496" cy="15330"/>
+            <a:off x="7010399" y="2746961"/>
+            <a:ext cx="230244" cy="339050"/>
           </a:xfrm>
           <a:prstGeom prst="straightConnector1">
             <a:avLst/>
@@ -6109,7 +6109,7 @@
             </a:r>
             <a:r>
               <a:rPr lang="es-419" dirty="0"/>
-              <a:t>): 10</a:t>
+              <a:t>): 20</a:t>
             </a:r>
           </a:p>
         </p:txBody>
@@ -6161,15 +6161,7 @@
             </a:pPr>
             <a:r>
               <a:rPr lang="es-419" dirty="0"/>
-              <a:t>Se avanzo con los modelos de Usuario y POST, añadiendo autenticación al sistema mediante credenciales, se pueden realizar las acciones básicas de un </a:t>
-            </a:r>
-            <a:r>
-              <a:rPr lang="es-419" dirty="0" err="1"/>
-              <a:t>crud</a:t>
-            </a:r>
-            <a:r>
-              <a:rPr lang="es-419" dirty="0"/>
-              <a:t> para el modelo de post.</a:t>
+              <a:t>Se implementaron los roles de sistema permitiendo que solamente el administrador pueda tener control total sobre las noticias. </a:t>
             </a:r>
           </a:p>
           <a:p>
@@ -6179,7 +6171,7 @@
             </a:pPr>
             <a:r>
               <a:rPr lang="es-419" dirty="0"/>
-              <a:t>Problemas encontrados: No podemos habilitar los roles para los usuarios del sistema, estamos buscando información para integrarlo eficazmente.</a:t>
+              <a:t>Se ha restringido el control que el usuario posee.</a:t>
             </a:r>
           </a:p>
         </p:txBody>
@@ -6198,7 +6190,7 @@
         </p:nvSpPr>
         <p:spPr>
           <a:xfrm>
-            <a:off x="7424895" y="2549954"/>
+            <a:off x="7240643" y="2226234"/>
             <a:ext cx="2474857" cy="1041453"/>
           </a:xfrm>
           <a:prstGeom prst="roundRect">
@@ -7177,7 +7169,7 @@
         </p:nvSpPr>
         <p:spPr>
           <a:xfrm>
-            <a:off x="1199469" y="1482456"/>
+            <a:off x="6761370" y="2404664"/>
             <a:ext cx="1647426" cy="726077"/>
           </a:xfrm>
           <a:prstGeom prst="roundRect">
@@ -7274,7 +7266,7 @@
             <a:pPr algn="ctr"/>
             <a:r>
               <a:rPr lang="es-MX" dirty="0"/>
-              <a:t>10</a:t>
+              <a:t>20</a:t>
             </a:r>
             <a:endParaRPr lang="es-CL" dirty="0"/>
           </a:p>
@@ -7294,7 +7286,7 @@
         </p:nvSpPr>
         <p:spPr>
           <a:xfrm>
-            <a:off x="1199469" y="2424435"/>
+            <a:off x="6761370" y="3250079"/>
             <a:ext cx="1647426" cy="726077"/>
           </a:xfrm>
           <a:prstGeom prst="roundRect">
@@ -7361,7 +7353,7 @@
         </p:nvSpPr>
         <p:spPr>
           <a:xfrm>
-            <a:off x="1149632" y="3398027"/>
+            <a:off x="6736451" y="4097992"/>
             <a:ext cx="1697264" cy="856492"/>
           </a:xfrm>
           <a:prstGeom prst="roundRect">
@@ -7416,10 +7408,10 @@
       </p:sp>
       <p:sp>
         <p:nvSpPr>
-          <p:cNvPr id="6" name="Rectángulo redondeado 13">
+          <p:cNvPr id="7" name="Rectángulo redondeado 13">
             <a:extLst>
               <a:ext uri="{FF2B5EF4-FFF2-40B4-BE49-F238E27FC236}">
-                <a16:creationId xmlns:a16="http://schemas.microsoft.com/office/drawing/2014/main" id="{774C1C39-DBF5-4892-AA64-BBD1B90314F5}"/>
+                <a16:creationId xmlns:a16="http://schemas.microsoft.com/office/drawing/2014/main" id="{26038847-094B-4843-A355-B0B5716FB944}"/>
               </a:ext>
             </a:extLst>
           </p:cNvPr>
@@ -7428,8 +7420,8 @@
         </p:nvSpPr>
         <p:spPr>
           <a:xfrm>
-            <a:off x="1149631" y="4536408"/>
-            <a:ext cx="1697264" cy="839136"/>
+            <a:off x="8685777" y="3250202"/>
+            <a:ext cx="1647426" cy="726077"/>
           </a:xfrm>
           <a:prstGeom prst="roundRect">
             <a:avLst/>
@@ -7471,17 +7463,327 @@
                   <a:schemeClr val="tx1"/>
                 </a:solidFill>
               </a:rPr>
-              <a:t>(2)</a:t>
-            </a:r>
-            <a:r>
-              <a:rPr lang="es-419" sz="800" dirty="0">
+              <a:t>(3) Como administrador quiero ingresar los datos para crear un post.</a:t>
+            </a:r>
+            <a:endParaRPr lang="es-419" sz="800" dirty="0">
+              <a:solidFill>
+                <a:schemeClr val="tx1"/>
+              </a:solidFill>
+            </a:endParaRPr>
+          </a:p>
+        </p:txBody>
+      </p:sp>
+      <p:sp>
+        <p:nvSpPr>
+          <p:cNvPr id="8" name="Rectángulo redondeado 13">
+            <a:extLst>
+              <a:ext uri="{FF2B5EF4-FFF2-40B4-BE49-F238E27FC236}">
+                <a16:creationId xmlns:a16="http://schemas.microsoft.com/office/drawing/2014/main" id="{63ABB8AD-5F39-47ED-AE92-01C8464CFD9F}"/>
+              </a:ext>
+            </a:extLst>
+          </p:cNvPr>
+          <p:cNvSpPr/>
+          <p:nvPr/>
+        </p:nvSpPr>
+        <p:spPr>
+          <a:xfrm>
+            <a:off x="8685777" y="4076224"/>
+            <a:ext cx="1647426" cy="726077"/>
+          </a:xfrm>
+          <a:prstGeom prst="roundRect">
+            <a:avLst/>
+          </a:prstGeom>
+          <a:solidFill>
+            <a:schemeClr val="accent6">
+              <a:lumMod val="60000"/>
+              <a:lumOff val="40000"/>
+            </a:schemeClr>
+          </a:solidFill>
+        </p:spPr>
+        <p:style>
+          <a:lnRef idx="2">
+            <a:schemeClr val="accent1">
+              <a:shade val="50000"/>
+            </a:schemeClr>
+          </a:lnRef>
+          <a:fillRef idx="1">
+            <a:schemeClr val="accent1"/>
+          </a:fillRef>
+          <a:effectRef idx="0">
+            <a:schemeClr val="accent1"/>
+          </a:effectRef>
+          <a:fontRef idx="minor">
+            <a:schemeClr val="lt1"/>
+          </a:fontRef>
+        </p:style>
+        <p:txBody>
+          <a:bodyPr rtlCol="0" anchor="ctr"/>
+          <a:lstStyle/>
+          <a:p>
+            <a:pPr marL="285750" indent="-285750">
+              <a:buFont typeface="Arial" panose="020B0604020202020204" pitchFamily="34" charset="0"/>
+              <a:buChar char="•"/>
+            </a:pPr>
+            <a:r>
+              <a:rPr lang="es-MX" sz="800" dirty="0">
                 <a:solidFill>
                   <a:schemeClr val="tx1"/>
                 </a:solidFill>
               </a:rPr>
-              <a:t> Como administrador quiero crear un post para publicar una noticia</a:t>
-            </a:r>
-            <a:endParaRPr lang="es-MX" sz="800" dirty="0">
+              <a:t>(2) Como administrador quiero editar un post para cambiar su contenido.</a:t>
+            </a:r>
+            <a:endParaRPr lang="es-419" sz="800" dirty="0">
+              <a:solidFill>
+                <a:schemeClr val="tx1"/>
+              </a:solidFill>
+            </a:endParaRPr>
+          </a:p>
+        </p:txBody>
+      </p:sp>
+      <p:sp>
+        <p:nvSpPr>
+          <p:cNvPr id="11" name="Rectángulo redondeado 13">
+            <a:extLst>
+              <a:ext uri="{FF2B5EF4-FFF2-40B4-BE49-F238E27FC236}">
+                <a16:creationId xmlns:a16="http://schemas.microsoft.com/office/drawing/2014/main" id="{2EDE9D6C-F241-437B-8360-B99FA517C3B0}"/>
+              </a:ext>
+            </a:extLst>
+          </p:cNvPr>
+          <p:cNvSpPr/>
+          <p:nvPr/>
+        </p:nvSpPr>
+        <p:spPr>
+          <a:xfrm>
+            <a:off x="8685777" y="4870840"/>
+            <a:ext cx="1647426" cy="730462"/>
+          </a:xfrm>
+          <a:prstGeom prst="roundRect">
+            <a:avLst/>
+          </a:prstGeom>
+          <a:solidFill>
+            <a:schemeClr val="accent6">
+              <a:lumMod val="60000"/>
+              <a:lumOff val="40000"/>
+            </a:schemeClr>
+          </a:solidFill>
+        </p:spPr>
+        <p:style>
+          <a:lnRef idx="2">
+            <a:schemeClr val="accent1">
+              <a:shade val="50000"/>
+            </a:schemeClr>
+          </a:lnRef>
+          <a:fillRef idx="1">
+            <a:schemeClr val="accent1"/>
+          </a:fillRef>
+          <a:effectRef idx="0">
+            <a:schemeClr val="accent1"/>
+          </a:effectRef>
+          <a:fontRef idx="minor">
+            <a:schemeClr val="lt1"/>
+          </a:fontRef>
+        </p:style>
+        <p:txBody>
+          <a:bodyPr rtlCol="0" anchor="ctr"/>
+          <a:lstStyle/>
+          <a:p>
+            <a:pPr marL="285750" indent="-285750">
+              <a:buFont typeface="Arial" panose="020B0604020202020204" pitchFamily="34" charset="0"/>
+              <a:buChar char="•"/>
+            </a:pPr>
+            <a:r>
+              <a:rPr lang="es-MX" sz="800" dirty="0">
+                <a:solidFill>
+                  <a:schemeClr val="tx1"/>
+                </a:solidFill>
+              </a:rPr>
+              <a:t>(2) Como administrador quiero ingresar nuevos datos para editarlos.</a:t>
+            </a:r>
+            <a:endParaRPr lang="es-419" sz="800" dirty="0">
+              <a:solidFill>
+                <a:schemeClr val="tx1"/>
+              </a:solidFill>
+            </a:endParaRPr>
+          </a:p>
+        </p:txBody>
+      </p:sp>
+      <p:sp>
+        <p:nvSpPr>
+          <p:cNvPr id="18" name="Rectángulo redondeado 13">
+            <a:extLst>
+              <a:ext uri="{FF2B5EF4-FFF2-40B4-BE49-F238E27FC236}">
+                <a16:creationId xmlns:a16="http://schemas.microsoft.com/office/drawing/2014/main" id="{578A71BB-D9D6-4B0A-88FE-ECD93BAF67E1}"/>
+              </a:ext>
+            </a:extLst>
+          </p:cNvPr>
+          <p:cNvSpPr/>
+          <p:nvPr/>
+        </p:nvSpPr>
+        <p:spPr>
+          <a:xfrm>
+            <a:off x="8699475" y="2424180"/>
+            <a:ext cx="1647426" cy="726077"/>
+          </a:xfrm>
+          <a:prstGeom prst="roundRect">
+            <a:avLst/>
+          </a:prstGeom>
+          <a:solidFill>
+            <a:schemeClr val="accent6">
+              <a:lumMod val="60000"/>
+              <a:lumOff val="40000"/>
+            </a:schemeClr>
+          </a:solidFill>
+        </p:spPr>
+        <p:style>
+          <a:lnRef idx="2">
+            <a:schemeClr val="accent1">
+              <a:shade val="50000"/>
+            </a:schemeClr>
+          </a:lnRef>
+          <a:fillRef idx="1">
+            <a:schemeClr val="accent1"/>
+          </a:fillRef>
+          <a:effectRef idx="0">
+            <a:schemeClr val="accent1"/>
+          </a:effectRef>
+          <a:fontRef idx="minor">
+            <a:schemeClr val="lt1"/>
+          </a:fontRef>
+        </p:style>
+        <p:txBody>
+          <a:bodyPr rtlCol="0" anchor="ctr"/>
+          <a:lstStyle/>
+          <a:p>
+            <a:pPr marL="285750" indent="-285750">
+              <a:buFont typeface="Arial" panose="020B0604020202020204" pitchFamily="34" charset="0"/>
+              <a:buChar char="•"/>
+            </a:pPr>
+            <a:r>
+              <a:rPr lang="es-MX" sz="800" dirty="0">
+                <a:solidFill>
+                  <a:schemeClr val="tx1"/>
+                </a:solidFill>
+              </a:rPr>
+              <a:t>(3) Como administrador luego de crear el post quiero ser redirigido al post para verlo y verificarlo.</a:t>
+            </a:r>
+            <a:endParaRPr lang="es-419" sz="800" dirty="0">
+              <a:solidFill>
+                <a:schemeClr val="tx1"/>
+              </a:solidFill>
+            </a:endParaRPr>
+          </a:p>
+        </p:txBody>
+      </p:sp>
+      <p:sp>
+        <p:nvSpPr>
+          <p:cNvPr id="22" name="Flecha: a la derecha 21">
+            <a:extLst>
+              <a:ext uri="{FF2B5EF4-FFF2-40B4-BE49-F238E27FC236}">
+                <a16:creationId xmlns:a16="http://schemas.microsoft.com/office/drawing/2014/main" id="{E2BF3C53-FB11-4176-9E81-8F984FD5997D}"/>
+              </a:ext>
+            </a:extLst>
+          </p:cNvPr>
+          <p:cNvSpPr/>
+          <p:nvPr/>
+        </p:nvSpPr>
+        <p:spPr>
+          <a:xfrm>
+            <a:off x="0" y="5809204"/>
+            <a:ext cx="689289" cy="436596"/>
+          </a:xfrm>
+          <a:prstGeom prst="rightArrow">
+            <a:avLst/>
+          </a:prstGeom>
+        </p:spPr>
+        <p:style>
+          <a:lnRef idx="2">
+            <a:schemeClr val="accent1">
+              <a:shade val="50000"/>
+            </a:schemeClr>
+          </a:lnRef>
+          <a:fillRef idx="1">
+            <a:schemeClr val="accent1"/>
+          </a:fillRef>
+          <a:effectRef idx="0">
+            <a:schemeClr val="accent1"/>
+          </a:effectRef>
+          <a:fontRef idx="minor">
+            <a:schemeClr val="lt1"/>
+          </a:fontRef>
+        </p:style>
+        <p:txBody>
+          <a:bodyPr rtlCol="0" anchor="ctr"/>
+          <a:lstStyle/>
+          <a:p>
+            <a:pPr algn="ctr"/>
+            <a:r>
+              <a:rPr lang="es-MX" dirty="0"/>
+              <a:t>0</a:t>
+            </a:r>
+            <a:endParaRPr lang="es-CL" dirty="0"/>
+          </a:p>
+        </p:txBody>
+      </p:sp>
+      <p:sp>
+        <p:nvSpPr>
+          <p:cNvPr id="24" name="Rectángulo redondeado 13">
+            <a:extLst>
+              <a:ext uri="{FF2B5EF4-FFF2-40B4-BE49-F238E27FC236}">
+                <a16:creationId xmlns:a16="http://schemas.microsoft.com/office/drawing/2014/main" id="{C7DC4214-BCB1-4FB7-A397-3B6D29EA3A95}"/>
+              </a:ext>
+            </a:extLst>
+          </p:cNvPr>
+          <p:cNvSpPr/>
+          <p:nvPr/>
+        </p:nvSpPr>
+        <p:spPr>
+          <a:xfrm>
+            <a:off x="8685777" y="1624121"/>
+            <a:ext cx="1647426" cy="726077"/>
+          </a:xfrm>
+          <a:prstGeom prst="roundRect">
+            <a:avLst/>
+          </a:prstGeom>
+          <a:solidFill>
+            <a:schemeClr val="accent6">
+              <a:lumMod val="60000"/>
+              <a:lumOff val="40000"/>
+            </a:schemeClr>
+          </a:solidFill>
+        </p:spPr>
+        <p:style>
+          <a:lnRef idx="2">
+            <a:schemeClr val="accent1">
+              <a:shade val="50000"/>
+            </a:schemeClr>
+          </a:lnRef>
+          <a:fillRef idx="1">
+            <a:schemeClr val="accent1"/>
+          </a:fillRef>
+          <a:effectRef idx="0">
+            <a:schemeClr val="accent1"/>
+          </a:effectRef>
+          <a:fontRef idx="minor">
+            <a:schemeClr val="lt1"/>
+          </a:fontRef>
+        </p:style>
+        <p:txBody>
+          <a:bodyPr rtlCol="0" anchor="ctr"/>
+          <a:lstStyle/>
+          <a:p>
+            <a:pPr marL="285750" indent="-285750">
+              <a:buFont typeface="Arial" panose="020B0604020202020204" pitchFamily="34" charset="0"/>
+              <a:buChar char="•"/>
+            </a:pPr>
+            <a:r>
+              <a:rPr lang="es-MX" sz="800" dirty="0">
+                <a:solidFill>
+                  <a:schemeClr val="tx1"/>
+                </a:solidFill>
+              </a:rPr>
+              <a:t>(2) Como administrador quiero eliminar un post que me pertenezca para sacarlo del blog.</a:t>
+            </a:r>
+            <a:endParaRPr lang="es-419" sz="800" dirty="0">
               <a:solidFill>
                 <a:schemeClr val="tx1"/>
               </a:solidFill>

</xml_diff>

<commit_message>
Planificacion Sprint 2 - Comentarios
</commit_message>
<xml_diff>
--- a/Monitoreo_Proyecto.pptx
+++ b/Monitoreo_Proyecto.pptx
@@ -230,7 +230,7 @@
           <a:p>
             <a:fld id="{EC13577B-6902-467D-A26C-08A0DD5E4E03}" type="datetimeFigureOut">
               <a:rPr lang="en-US" smtClean="0"/>
-              <a:t>10/4/2020</a:t>
+              <a:t>10/14/2020</a:t>
             </a:fld>
             <a:endParaRPr lang="en-US" dirty="0"/>
           </a:p>
@@ -793,7 +793,7 @@
           <a:p>
             <a:fld id="{04AD7083-2812-4336-A862-6CB4E9DAA666}" type="datetime1">
               <a:rPr lang="en-US" smtClean="0"/>
-              <a:t>10/4/2020</a:t>
+              <a:t>10/14/2020</a:t>
             </a:fld>
             <a:endParaRPr lang="en-US" dirty="0"/>
           </a:p>
@@ -1070,7 +1070,7 @@
           <a:p>
             <a:fld id="{F426DB13-0979-4AFD-BE5D-BA943E81C2FF}" type="datetime1">
               <a:rPr lang="en-US" smtClean="0"/>
-              <a:t>10/4/2020</a:t>
+              <a:t>10/14/2020</a:t>
             </a:fld>
             <a:endParaRPr lang="en-US" dirty="0"/>
           </a:p>
@@ -1352,7 +1352,7 @@
           <a:p>
             <a:fld id="{ACA095C1-F76B-4592-A3BF-48B4D1BF64A5}" type="datetime1">
               <a:rPr lang="en-US" smtClean="0"/>
-              <a:t>10/4/2020</a:t>
+              <a:t>10/14/2020</a:t>
             </a:fld>
             <a:endParaRPr lang="en-US" dirty="0"/>
           </a:p>
@@ -1713,7 +1713,7 @@
           <a:p>
             <a:fld id="{F68BAF15-D946-438F-BA57-43A568DB52D7}" type="datetime1">
               <a:rPr lang="en-US" smtClean="0"/>
-              <a:t>10/4/2020</a:t>
+              <a:t>10/14/2020</a:t>
             </a:fld>
             <a:endParaRPr lang="en-US" dirty="0"/>
           </a:p>
@@ -2013,7 +2013,7 @@
           <a:p>
             <a:fld id="{635A5B98-0E43-43A4-8C2A-E00A6A883A04}" type="datetime1">
               <a:rPr lang="en-US" smtClean="0"/>
-              <a:t>10/4/2020</a:t>
+              <a:t>10/14/2020</a:t>
             </a:fld>
             <a:endParaRPr lang="en-US" dirty="0"/>
           </a:p>
@@ -2528,7 +2528,7 @@
           <a:p>
             <a:fld id="{45FB536E-04DA-42C8-BC01-49FDB8623C5B}" type="datetime1">
               <a:rPr lang="en-US" smtClean="0"/>
-              <a:t>10/4/2020</a:t>
+              <a:t>10/14/2020</a:t>
             </a:fld>
             <a:endParaRPr lang="en-US" dirty="0"/>
           </a:p>
@@ -3173,7 +3173,7 @@
           <a:p>
             <a:fld id="{EE38660A-ACB5-4EAE-A29D-584DB55BAC5B}" type="datetime1">
               <a:rPr lang="en-US" smtClean="0"/>
-              <a:t>10/4/2020</a:t>
+              <a:t>10/14/2020</a:t>
             </a:fld>
             <a:endParaRPr lang="en-US" dirty="0"/>
           </a:p>
@@ -3398,7 +3398,7 @@
           <a:p>
             <a:fld id="{68130BA2-7F47-4355-A40B-1D4E78D026D1}" type="datetime1">
               <a:rPr lang="en-US" smtClean="0"/>
-              <a:t>10/4/2020</a:t>
+              <a:t>10/14/2020</a:t>
             </a:fld>
             <a:endParaRPr lang="en-US" dirty="0"/>
           </a:p>
@@ -3539,7 +3539,7 @@
           <a:p>
             <a:fld id="{0C7FF9F2-B4E6-461D-80C5-31D1DFDBE4F3}" type="datetime1">
               <a:rPr lang="en-US" smtClean="0"/>
-              <a:t>10/4/2020</a:t>
+              <a:t>10/14/2020</a:t>
             </a:fld>
             <a:endParaRPr lang="en-US" dirty="0"/>
           </a:p>
@@ -3876,7 +3876,7 @@
           <a:p>
             <a:fld id="{338DC08D-1485-4CDD-BD12-A2AAA137B289}" type="datetime1">
               <a:rPr lang="en-US" smtClean="0"/>
-              <a:t>10/4/2020</a:t>
+              <a:t>10/14/2020</a:t>
             </a:fld>
             <a:endParaRPr lang="en-US" dirty="0"/>
           </a:p>
@@ -4133,7 +4133,7 @@
           <a:p>
             <a:fld id="{13D2B1DD-5C24-46B3-BEAE-43189A8FCAFF}" type="datetime1">
               <a:rPr lang="en-US" smtClean="0"/>
-              <a:t>10/4/2020</a:t>
+              <a:t>10/14/2020</a:t>
             </a:fld>
             <a:endParaRPr lang="en-US" dirty="0"/>
           </a:p>
@@ -4346,7 +4346,7 @@
           <a:p>
             <a:fld id="{565BA3BC-6560-4C09-A047-A8DF1A0DE359}" type="datetime1">
               <a:rPr lang="en-US" smtClean="0"/>
-              <a:t>10/4/2020</a:t>
+              <a:t>10/14/2020</a:t>
             </a:fld>
             <a:endParaRPr lang="en-US" dirty="0"/>
           </a:p>
@@ -5423,7 +5423,7 @@
             </a:r>
             <a:r>
               <a:rPr lang="es-419" b="1" dirty="0"/>
-              <a:t> Semana  2</a:t>
+              <a:t> Semana 5 </a:t>
             </a:r>
           </a:p>
         </p:txBody>
@@ -5617,7 +5617,7 @@
                   <a:schemeClr val="tx1"/>
                 </a:solidFill>
               </a:rPr>
-              <a:t>Historias no iniciadas: 8</a:t>
+              <a:t>Historias no iniciadas: 6</a:t>
             </a:r>
           </a:p>
           <a:p>
@@ -5681,7 +5681,7 @@
                   <a:schemeClr val="tx1"/>
                 </a:solidFill>
               </a:rPr>
-              <a:t>Historia iniciadas: 15</a:t>
+              <a:t>Historia iniciadas: 17</a:t>
             </a:r>
           </a:p>
           <a:p>
@@ -6073,7 +6073,7 @@
             </a:pPr>
             <a:r>
               <a:rPr lang="es-419" dirty="0"/>
-              <a:t>Sprint Actual: 1</a:t>
+              <a:t>Sprint Actual: 2</a:t>
             </a:r>
           </a:p>
           <a:p>
@@ -6161,18 +6161,13 @@
             </a:pPr>
             <a:r>
               <a:rPr lang="es-419" dirty="0"/>
-              <a:t>Se implementaron los roles de sistema permitiendo que solamente el administrador pueda tener control total sobre las noticias. </a:t>
-            </a:r>
-          </a:p>
-          <a:p>
-            <a:pPr marL="285750" indent="-285750">
-              <a:buFont typeface="Arial" panose="020B0604020202020204" pitchFamily="34" charset="0"/>
-              <a:buChar char="•"/>
-            </a:pPr>
-            <a:r>
-              <a:rPr lang="es-419" dirty="0"/>
-              <a:t>Se ha restringido el control que el usuario posee.</a:t>
-            </a:r>
+              <a:t>Se comenzará a implementar el modelo para gestionar comentarios en </a:t>
+            </a:r>
+            <a:r>
+              <a:rPr lang="es-419"/>
+              <a:t>las publicaciones.</a:t>
+            </a:r>
+            <a:endParaRPr lang="es-419" dirty="0"/>
           </a:p>
         </p:txBody>
       </p:sp>
@@ -7157,10 +7152,10 @@
       </p:sp>
       <p:sp>
         <p:nvSpPr>
-          <p:cNvPr id="19" name="Rectángulo redondeado 13">
+          <p:cNvPr id="28" name="Flecha: a la derecha 27">
             <a:extLst>
               <a:ext uri="{FF2B5EF4-FFF2-40B4-BE49-F238E27FC236}">
-                <a16:creationId xmlns:a16="http://schemas.microsoft.com/office/drawing/2014/main" id="{56F7FF38-780A-4D2E-B6D0-A143CD6DD705}"/>
+                <a16:creationId xmlns:a16="http://schemas.microsoft.com/office/drawing/2014/main" id="{55C74F92-0B15-4A15-8016-8E0992B3ED99}"/>
               </a:ext>
             </a:extLst>
           </p:cNvPr>
@@ -7169,18 +7164,12 @@
         </p:nvSpPr>
         <p:spPr>
           <a:xfrm>
-            <a:off x="6761370" y="2404664"/>
-            <a:ext cx="1647426" cy="726077"/>
-          </a:xfrm>
-          <a:prstGeom prst="roundRect">
+            <a:off x="22098" y="1627196"/>
+            <a:ext cx="689289" cy="436596"/>
+          </a:xfrm>
+          <a:prstGeom prst="rightArrow">
             <a:avLst/>
           </a:prstGeom>
-          <a:solidFill>
-            <a:schemeClr val="accent6">
-              <a:lumMod val="60000"/>
-              <a:lumOff val="40000"/>
-            </a:schemeClr>
-          </a:solidFill>
         </p:spPr>
         <p:style>
           <a:lnRef idx="2">
@@ -7202,32 +7191,21 @@
           <a:bodyPr rtlCol="0" anchor="ctr"/>
           <a:lstStyle/>
           <a:p>
-            <a:pPr marL="285750" indent="-285750">
-              <a:buFont typeface="Arial" panose="020B0604020202020204" pitchFamily="34" charset="0"/>
-              <a:buChar char="•"/>
-            </a:pPr>
-            <a:r>
-              <a:rPr lang="es-MX" sz="800" dirty="0">
-                <a:solidFill>
-                  <a:schemeClr val="tx1"/>
-                </a:solidFill>
-              </a:rPr>
-              <a:t>(2)Como administrador quiero crear un post para publicar una noticia.</a:t>
-            </a:r>
-            <a:endParaRPr lang="es-419" sz="800" dirty="0">
-              <a:solidFill>
-                <a:schemeClr val="tx1"/>
-              </a:solidFill>
-            </a:endParaRPr>
-          </a:p>
-        </p:txBody>
-      </p:sp>
-      <p:sp>
-        <p:nvSpPr>
-          <p:cNvPr id="28" name="Flecha: a la derecha 27">
+            <a:pPr algn="ctr"/>
+            <a:r>
+              <a:rPr lang="es-MX" dirty="0"/>
+              <a:t>7</a:t>
+            </a:r>
+            <a:endParaRPr lang="es-CL" dirty="0"/>
+          </a:p>
+        </p:txBody>
+      </p:sp>
+      <p:sp>
+        <p:nvSpPr>
+          <p:cNvPr id="22" name="Flecha: a la derecha 21">
             <a:extLst>
               <a:ext uri="{FF2B5EF4-FFF2-40B4-BE49-F238E27FC236}">
-                <a16:creationId xmlns:a16="http://schemas.microsoft.com/office/drawing/2014/main" id="{55C74F92-0B15-4A15-8016-8E0992B3ED99}"/>
+                <a16:creationId xmlns:a16="http://schemas.microsoft.com/office/drawing/2014/main" id="{E2BF3C53-FB11-4176-9E81-8F984FD5997D}"/>
               </a:ext>
             </a:extLst>
           </p:cNvPr>
@@ -7236,7 +7214,7 @@
         </p:nvSpPr>
         <p:spPr>
           <a:xfrm>
-            <a:off x="22098" y="1627196"/>
+            <a:off x="0" y="5809204"/>
             <a:ext cx="689289" cy="436596"/>
           </a:xfrm>
           <a:prstGeom prst="rightArrow">
@@ -7266,7 +7244,7 @@
             <a:pPr algn="ctr"/>
             <a:r>
               <a:rPr lang="es-MX" dirty="0"/>
-              <a:t>20</a:t>
+              <a:t>0</a:t>
             </a:r>
             <a:endParaRPr lang="es-CL" dirty="0"/>
           </a:p>
@@ -7274,10 +7252,10 @@
       </p:sp>
       <p:sp>
         <p:nvSpPr>
-          <p:cNvPr id="3" name="Rectángulo redondeado 13">
+          <p:cNvPr id="37" name="Rectángulo redondeado 13">
             <a:extLst>
               <a:ext uri="{FF2B5EF4-FFF2-40B4-BE49-F238E27FC236}">
-                <a16:creationId xmlns:a16="http://schemas.microsoft.com/office/drawing/2014/main" id="{0D167CC2-3B85-4CA3-BEC6-A2DAF64D32E6}"/>
+                <a16:creationId xmlns:a16="http://schemas.microsoft.com/office/drawing/2014/main" id="{46DEC2E1-7FE7-475E-B6F4-66BCFC06C3F0}"/>
               </a:ext>
             </a:extLst>
           </p:cNvPr>
@@ -7286,7 +7264,7 @@
         </p:nvSpPr>
         <p:spPr>
           <a:xfrm>
-            <a:off x="6761370" y="3250079"/>
+            <a:off x="1172527" y="2063792"/>
             <a:ext cx="1647426" cy="726077"/>
           </a:xfrm>
           <a:prstGeom prst="roundRect">
@@ -7329,7 +7307,7 @@
                   <a:schemeClr val="tx1"/>
                 </a:solidFill>
               </a:rPr>
-              <a:t>(3) Como administrador quiero usar mis credenciales para ingresar al sistema.</a:t>
+              <a:t>(2)Como usuario quiero comentar en el post para añadir un comentario.</a:t>
             </a:r>
             <a:endParaRPr lang="es-419" sz="800" dirty="0">
               <a:solidFill>
@@ -7341,10 +7319,10 @@
       </p:sp>
       <p:sp>
         <p:nvSpPr>
-          <p:cNvPr id="5" name="Rectángulo redondeado 13">
+          <p:cNvPr id="39" name="Rectángulo redondeado 13">
             <a:extLst>
               <a:ext uri="{FF2B5EF4-FFF2-40B4-BE49-F238E27FC236}">
-                <a16:creationId xmlns:a16="http://schemas.microsoft.com/office/drawing/2014/main" id="{B6E6421E-631E-499F-B2C4-FEAEA70908E3}"/>
+                <a16:creationId xmlns:a16="http://schemas.microsoft.com/office/drawing/2014/main" id="{8A8884F0-48EB-40BE-9702-EA9C8C5BE7F3}"/>
               </a:ext>
             </a:extLst>
           </p:cNvPr>
@@ -7353,8 +7331,8 @@
         </p:nvSpPr>
         <p:spPr>
           <a:xfrm>
-            <a:off x="6736451" y="4097992"/>
-            <a:ext cx="1697264" cy="856492"/>
+            <a:off x="1172527" y="2895701"/>
+            <a:ext cx="1647426" cy="726077"/>
           </a:xfrm>
           <a:prstGeom prst="roundRect">
             <a:avLst/>
@@ -7396,7 +7374,7 @@
                   <a:schemeClr val="tx1"/>
                 </a:solidFill>
               </a:rPr>
-              <a:t>(3) Como administrador quiero ser redirigido a la vista de administradores para poder acceder a mis funciones de administrador</a:t>
+              <a:t>(3)Como usuario quiero escribir para poder dejar mi comentario.</a:t>
             </a:r>
             <a:endParaRPr lang="es-419" sz="800" dirty="0">
               <a:solidFill>
@@ -7408,10 +7386,10 @@
       </p:sp>
       <p:sp>
         <p:nvSpPr>
-          <p:cNvPr id="7" name="Rectángulo redondeado 13">
+          <p:cNvPr id="41" name="Rectángulo redondeado 13">
             <a:extLst>
               <a:ext uri="{FF2B5EF4-FFF2-40B4-BE49-F238E27FC236}">
-                <a16:creationId xmlns:a16="http://schemas.microsoft.com/office/drawing/2014/main" id="{26038847-094B-4843-A355-B0B5716FB944}"/>
+                <a16:creationId xmlns:a16="http://schemas.microsoft.com/office/drawing/2014/main" id="{705BEC6B-D1C8-4960-AF13-E03CDB402FD2}"/>
               </a:ext>
             </a:extLst>
           </p:cNvPr>
@@ -7420,17 +7398,14 @@
         </p:nvSpPr>
         <p:spPr>
           <a:xfrm>
-            <a:off x="8685777" y="3250202"/>
+            <a:off x="1172527" y="3791758"/>
             <a:ext cx="1647426" cy="726077"/>
           </a:xfrm>
           <a:prstGeom prst="roundRect">
             <a:avLst/>
           </a:prstGeom>
           <a:solidFill>
-            <a:schemeClr val="accent6">
-              <a:lumMod val="60000"/>
-              <a:lumOff val="40000"/>
-            </a:schemeClr>
+            <a:srgbClr val="CC66FF"/>
           </a:solidFill>
         </p:spPr>
         <p:style>
@@ -7463,325 +7438,7 @@
                   <a:schemeClr val="tx1"/>
                 </a:solidFill>
               </a:rPr>
-              <a:t>(3) Como administrador quiero ingresar los datos para crear un post.</a:t>
-            </a:r>
-            <a:endParaRPr lang="es-419" sz="800" dirty="0">
-              <a:solidFill>
-                <a:schemeClr val="tx1"/>
-              </a:solidFill>
-            </a:endParaRPr>
-          </a:p>
-        </p:txBody>
-      </p:sp>
-      <p:sp>
-        <p:nvSpPr>
-          <p:cNvPr id="8" name="Rectángulo redondeado 13">
-            <a:extLst>
-              <a:ext uri="{FF2B5EF4-FFF2-40B4-BE49-F238E27FC236}">
-                <a16:creationId xmlns:a16="http://schemas.microsoft.com/office/drawing/2014/main" id="{63ABB8AD-5F39-47ED-AE92-01C8464CFD9F}"/>
-              </a:ext>
-            </a:extLst>
-          </p:cNvPr>
-          <p:cNvSpPr/>
-          <p:nvPr/>
-        </p:nvSpPr>
-        <p:spPr>
-          <a:xfrm>
-            <a:off x="8685777" y="4076224"/>
-            <a:ext cx="1647426" cy="726077"/>
-          </a:xfrm>
-          <a:prstGeom prst="roundRect">
-            <a:avLst/>
-          </a:prstGeom>
-          <a:solidFill>
-            <a:schemeClr val="accent6">
-              <a:lumMod val="60000"/>
-              <a:lumOff val="40000"/>
-            </a:schemeClr>
-          </a:solidFill>
-        </p:spPr>
-        <p:style>
-          <a:lnRef idx="2">
-            <a:schemeClr val="accent1">
-              <a:shade val="50000"/>
-            </a:schemeClr>
-          </a:lnRef>
-          <a:fillRef idx="1">
-            <a:schemeClr val="accent1"/>
-          </a:fillRef>
-          <a:effectRef idx="0">
-            <a:schemeClr val="accent1"/>
-          </a:effectRef>
-          <a:fontRef idx="minor">
-            <a:schemeClr val="lt1"/>
-          </a:fontRef>
-        </p:style>
-        <p:txBody>
-          <a:bodyPr rtlCol="0" anchor="ctr"/>
-          <a:lstStyle/>
-          <a:p>
-            <a:pPr marL="285750" indent="-285750">
-              <a:buFont typeface="Arial" panose="020B0604020202020204" pitchFamily="34" charset="0"/>
-              <a:buChar char="•"/>
-            </a:pPr>
-            <a:r>
-              <a:rPr lang="es-MX" sz="800" dirty="0">
-                <a:solidFill>
-                  <a:schemeClr val="tx1"/>
-                </a:solidFill>
-              </a:rPr>
-              <a:t>(2) Como administrador quiero editar un post para cambiar su contenido.</a:t>
-            </a:r>
-            <a:endParaRPr lang="es-419" sz="800" dirty="0">
-              <a:solidFill>
-                <a:schemeClr val="tx1"/>
-              </a:solidFill>
-            </a:endParaRPr>
-          </a:p>
-        </p:txBody>
-      </p:sp>
-      <p:sp>
-        <p:nvSpPr>
-          <p:cNvPr id="11" name="Rectángulo redondeado 13">
-            <a:extLst>
-              <a:ext uri="{FF2B5EF4-FFF2-40B4-BE49-F238E27FC236}">
-                <a16:creationId xmlns:a16="http://schemas.microsoft.com/office/drawing/2014/main" id="{2EDE9D6C-F241-437B-8360-B99FA517C3B0}"/>
-              </a:ext>
-            </a:extLst>
-          </p:cNvPr>
-          <p:cNvSpPr/>
-          <p:nvPr/>
-        </p:nvSpPr>
-        <p:spPr>
-          <a:xfrm>
-            <a:off x="8685777" y="4870840"/>
-            <a:ext cx="1647426" cy="730462"/>
-          </a:xfrm>
-          <a:prstGeom prst="roundRect">
-            <a:avLst/>
-          </a:prstGeom>
-          <a:solidFill>
-            <a:schemeClr val="accent6">
-              <a:lumMod val="60000"/>
-              <a:lumOff val="40000"/>
-            </a:schemeClr>
-          </a:solidFill>
-        </p:spPr>
-        <p:style>
-          <a:lnRef idx="2">
-            <a:schemeClr val="accent1">
-              <a:shade val="50000"/>
-            </a:schemeClr>
-          </a:lnRef>
-          <a:fillRef idx="1">
-            <a:schemeClr val="accent1"/>
-          </a:fillRef>
-          <a:effectRef idx="0">
-            <a:schemeClr val="accent1"/>
-          </a:effectRef>
-          <a:fontRef idx="minor">
-            <a:schemeClr val="lt1"/>
-          </a:fontRef>
-        </p:style>
-        <p:txBody>
-          <a:bodyPr rtlCol="0" anchor="ctr"/>
-          <a:lstStyle/>
-          <a:p>
-            <a:pPr marL="285750" indent="-285750">
-              <a:buFont typeface="Arial" panose="020B0604020202020204" pitchFamily="34" charset="0"/>
-              <a:buChar char="•"/>
-            </a:pPr>
-            <a:r>
-              <a:rPr lang="es-MX" sz="800" dirty="0">
-                <a:solidFill>
-                  <a:schemeClr val="tx1"/>
-                </a:solidFill>
-              </a:rPr>
-              <a:t>(2) Como administrador quiero ingresar nuevos datos para editarlos.</a:t>
-            </a:r>
-            <a:endParaRPr lang="es-419" sz="800" dirty="0">
-              <a:solidFill>
-                <a:schemeClr val="tx1"/>
-              </a:solidFill>
-            </a:endParaRPr>
-          </a:p>
-        </p:txBody>
-      </p:sp>
-      <p:sp>
-        <p:nvSpPr>
-          <p:cNvPr id="18" name="Rectángulo redondeado 13">
-            <a:extLst>
-              <a:ext uri="{FF2B5EF4-FFF2-40B4-BE49-F238E27FC236}">
-                <a16:creationId xmlns:a16="http://schemas.microsoft.com/office/drawing/2014/main" id="{578A71BB-D9D6-4B0A-88FE-ECD93BAF67E1}"/>
-              </a:ext>
-            </a:extLst>
-          </p:cNvPr>
-          <p:cNvSpPr/>
-          <p:nvPr/>
-        </p:nvSpPr>
-        <p:spPr>
-          <a:xfrm>
-            <a:off x="8699475" y="2424180"/>
-            <a:ext cx="1647426" cy="726077"/>
-          </a:xfrm>
-          <a:prstGeom prst="roundRect">
-            <a:avLst/>
-          </a:prstGeom>
-          <a:solidFill>
-            <a:schemeClr val="accent6">
-              <a:lumMod val="60000"/>
-              <a:lumOff val="40000"/>
-            </a:schemeClr>
-          </a:solidFill>
-        </p:spPr>
-        <p:style>
-          <a:lnRef idx="2">
-            <a:schemeClr val="accent1">
-              <a:shade val="50000"/>
-            </a:schemeClr>
-          </a:lnRef>
-          <a:fillRef idx="1">
-            <a:schemeClr val="accent1"/>
-          </a:fillRef>
-          <a:effectRef idx="0">
-            <a:schemeClr val="accent1"/>
-          </a:effectRef>
-          <a:fontRef idx="minor">
-            <a:schemeClr val="lt1"/>
-          </a:fontRef>
-        </p:style>
-        <p:txBody>
-          <a:bodyPr rtlCol="0" anchor="ctr"/>
-          <a:lstStyle/>
-          <a:p>
-            <a:pPr marL="285750" indent="-285750">
-              <a:buFont typeface="Arial" panose="020B0604020202020204" pitchFamily="34" charset="0"/>
-              <a:buChar char="•"/>
-            </a:pPr>
-            <a:r>
-              <a:rPr lang="es-MX" sz="800" dirty="0">
-                <a:solidFill>
-                  <a:schemeClr val="tx1"/>
-                </a:solidFill>
-              </a:rPr>
-              <a:t>(3) Como administrador luego de crear el post quiero ser redirigido al post para verlo y verificarlo.</a:t>
-            </a:r>
-            <a:endParaRPr lang="es-419" sz="800" dirty="0">
-              <a:solidFill>
-                <a:schemeClr val="tx1"/>
-              </a:solidFill>
-            </a:endParaRPr>
-          </a:p>
-        </p:txBody>
-      </p:sp>
-      <p:sp>
-        <p:nvSpPr>
-          <p:cNvPr id="22" name="Flecha: a la derecha 21">
-            <a:extLst>
-              <a:ext uri="{FF2B5EF4-FFF2-40B4-BE49-F238E27FC236}">
-                <a16:creationId xmlns:a16="http://schemas.microsoft.com/office/drawing/2014/main" id="{E2BF3C53-FB11-4176-9E81-8F984FD5997D}"/>
-              </a:ext>
-            </a:extLst>
-          </p:cNvPr>
-          <p:cNvSpPr/>
-          <p:nvPr/>
-        </p:nvSpPr>
-        <p:spPr>
-          <a:xfrm>
-            <a:off x="0" y="5809204"/>
-            <a:ext cx="689289" cy="436596"/>
-          </a:xfrm>
-          <a:prstGeom prst="rightArrow">
-            <a:avLst/>
-          </a:prstGeom>
-        </p:spPr>
-        <p:style>
-          <a:lnRef idx="2">
-            <a:schemeClr val="accent1">
-              <a:shade val="50000"/>
-            </a:schemeClr>
-          </a:lnRef>
-          <a:fillRef idx="1">
-            <a:schemeClr val="accent1"/>
-          </a:fillRef>
-          <a:effectRef idx="0">
-            <a:schemeClr val="accent1"/>
-          </a:effectRef>
-          <a:fontRef idx="minor">
-            <a:schemeClr val="lt1"/>
-          </a:fontRef>
-        </p:style>
-        <p:txBody>
-          <a:bodyPr rtlCol="0" anchor="ctr"/>
-          <a:lstStyle/>
-          <a:p>
-            <a:pPr algn="ctr"/>
-            <a:r>
-              <a:rPr lang="es-MX" dirty="0"/>
-              <a:t>0</a:t>
-            </a:r>
-            <a:endParaRPr lang="es-CL" dirty="0"/>
-          </a:p>
-        </p:txBody>
-      </p:sp>
-      <p:sp>
-        <p:nvSpPr>
-          <p:cNvPr id="24" name="Rectángulo redondeado 13">
-            <a:extLst>
-              <a:ext uri="{FF2B5EF4-FFF2-40B4-BE49-F238E27FC236}">
-                <a16:creationId xmlns:a16="http://schemas.microsoft.com/office/drawing/2014/main" id="{C7DC4214-BCB1-4FB7-A397-3B6D29EA3A95}"/>
-              </a:ext>
-            </a:extLst>
-          </p:cNvPr>
-          <p:cNvSpPr/>
-          <p:nvPr/>
-        </p:nvSpPr>
-        <p:spPr>
-          <a:xfrm>
-            <a:off x="8685777" y="1624121"/>
-            <a:ext cx="1647426" cy="726077"/>
-          </a:xfrm>
-          <a:prstGeom prst="roundRect">
-            <a:avLst/>
-          </a:prstGeom>
-          <a:solidFill>
-            <a:schemeClr val="accent6">
-              <a:lumMod val="60000"/>
-              <a:lumOff val="40000"/>
-            </a:schemeClr>
-          </a:solidFill>
-        </p:spPr>
-        <p:style>
-          <a:lnRef idx="2">
-            <a:schemeClr val="accent1">
-              <a:shade val="50000"/>
-            </a:schemeClr>
-          </a:lnRef>
-          <a:fillRef idx="1">
-            <a:schemeClr val="accent1"/>
-          </a:fillRef>
-          <a:effectRef idx="0">
-            <a:schemeClr val="accent1"/>
-          </a:effectRef>
-          <a:fontRef idx="minor">
-            <a:schemeClr val="lt1"/>
-          </a:fontRef>
-        </p:style>
-        <p:txBody>
-          <a:bodyPr rtlCol="0" anchor="ctr"/>
-          <a:lstStyle/>
-          <a:p>
-            <a:pPr marL="285750" indent="-285750">
-              <a:buFont typeface="Arial" panose="020B0604020202020204" pitchFamily="34" charset="0"/>
-              <a:buChar char="•"/>
-            </a:pPr>
-            <a:r>
-              <a:rPr lang="es-MX" sz="800" dirty="0">
-                <a:solidFill>
-                  <a:schemeClr val="tx1"/>
-                </a:solidFill>
-              </a:rPr>
-              <a:t>(2) Como administrador quiero eliminar un post que me pertenezca para sacarlo del blog.</a:t>
+              <a:t>(2) Luego de crear el comentario debe aparecer el autor del comentario.</a:t>
             </a:r>
             <a:endParaRPr lang="es-419" sz="800" dirty="0">
               <a:solidFill>

</xml_diff>

<commit_message>
Actualizacion Semana 7 al monitoreo
</commit_message>
<xml_diff>
--- a/Monitoreo_Proyecto.pptx
+++ b/Monitoreo_Proyecto.pptx
@@ -230,7 +230,7 @@
           <a:p>
             <a:fld id="{EC13577B-6902-467D-A26C-08A0DD5E4E03}" type="datetimeFigureOut">
               <a:rPr lang="en-US" smtClean="0"/>
-              <a:t>10/21/2020</a:t>
+              <a:t>10/24/2020</a:t>
             </a:fld>
             <a:endParaRPr lang="en-US" dirty="0"/>
           </a:p>
@@ -793,7 +793,7 @@
           <a:p>
             <a:fld id="{04AD7083-2812-4336-A862-6CB4E9DAA666}" type="datetime1">
               <a:rPr lang="en-US" smtClean="0"/>
-              <a:t>10/21/2020</a:t>
+              <a:t>10/24/2020</a:t>
             </a:fld>
             <a:endParaRPr lang="en-US" dirty="0"/>
           </a:p>
@@ -1070,7 +1070,7 @@
           <a:p>
             <a:fld id="{F426DB13-0979-4AFD-BE5D-BA943E81C2FF}" type="datetime1">
               <a:rPr lang="en-US" smtClean="0"/>
-              <a:t>10/21/2020</a:t>
+              <a:t>10/24/2020</a:t>
             </a:fld>
             <a:endParaRPr lang="en-US" dirty="0"/>
           </a:p>
@@ -1352,7 +1352,7 @@
           <a:p>
             <a:fld id="{ACA095C1-F76B-4592-A3BF-48B4D1BF64A5}" type="datetime1">
               <a:rPr lang="en-US" smtClean="0"/>
-              <a:t>10/21/2020</a:t>
+              <a:t>10/24/2020</a:t>
             </a:fld>
             <a:endParaRPr lang="en-US" dirty="0"/>
           </a:p>
@@ -1713,7 +1713,7 @@
           <a:p>
             <a:fld id="{F68BAF15-D946-438F-BA57-43A568DB52D7}" type="datetime1">
               <a:rPr lang="en-US" smtClean="0"/>
-              <a:t>10/21/2020</a:t>
+              <a:t>10/24/2020</a:t>
             </a:fld>
             <a:endParaRPr lang="en-US" dirty="0"/>
           </a:p>
@@ -2013,7 +2013,7 @@
           <a:p>
             <a:fld id="{635A5B98-0E43-43A4-8C2A-E00A6A883A04}" type="datetime1">
               <a:rPr lang="en-US" smtClean="0"/>
-              <a:t>10/21/2020</a:t>
+              <a:t>10/24/2020</a:t>
             </a:fld>
             <a:endParaRPr lang="en-US" dirty="0"/>
           </a:p>
@@ -2528,7 +2528,7 @@
           <a:p>
             <a:fld id="{45FB536E-04DA-42C8-BC01-49FDB8623C5B}" type="datetime1">
               <a:rPr lang="en-US" smtClean="0"/>
-              <a:t>10/21/2020</a:t>
+              <a:t>10/24/2020</a:t>
             </a:fld>
             <a:endParaRPr lang="en-US" dirty="0"/>
           </a:p>
@@ -3173,7 +3173,7 @@
           <a:p>
             <a:fld id="{EE38660A-ACB5-4EAE-A29D-584DB55BAC5B}" type="datetime1">
               <a:rPr lang="en-US" smtClean="0"/>
-              <a:t>10/21/2020</a:t>
+              <a:t>10/24/2020</a:t>
             </a:fld>
             <a:endParaRPr lang="en-US" dirty="0"/>
           </a:p>
@@ -3398,7 +3398,7 @@
           <a:p>
             <a:fld id="{68130BA2-7F47-4355-A40B-1D4E78D026D1}" type="datetime1">
               <a:rPr lang="en-US" smtClean="0"/>
-              <a:t>10/21/2020</a:t>
+              <a:t>10/24/2020</a:t>
             </a:fld>
             <a:endParaRPr lang="en-US" dirty="0"/>
           </a:p>
@@ -3539,7 +3539,7 @@
           <a:p>
             <a:fld id="{0C7FF9F2-B4E6-461D-80C5-31D1DFDBE4F3}" type="datetime1">
               <a:rPr lang="en-US" smtClean="0"/>
-              <a:t>10/21/2020</a:t>
+              <a:t>10/24/2020</a:t>
             </a:fld>
             <a:endParaRPr lang="en-US" dirty="0"/>
           </a:p>
@@ -3876,7 +3876,7 @@
           <a:p>
             <a:fld id="{338DC08D-1485-4CDD-BD12-A2AAA137B289}" type="datetime1">
               <a:rPr lang="en-US" smtClean="0"/>
-              <a:t>10/21/2020</a:t>
+              <a:t>10/24/2020</a:t>
             </a:fld>
             <a:endParaRPr lang="en-US" dirty="0"/>
           </a:p>
@@ -4133,7 +4133,7 @@
           <a:p>
             <a:fld id="{13D2B1DD-5C24-46B3-BEAE-43189A8FCAFF}" type="datetime1">
               <a:rPr lang="en-US" smtClean="0"/>
-              <a:t>10/21/2020</a:t>
+              <a:t>10/24/2020</a:t>
             </a:fld>
             <a:endParaRPr lang="en-US" dirty="0"/>
           </a:p>
@@ -4346,7 +4346,7 @@
           <a:p>
             <a:fld id="{565BA3BC-6560-4C09-A047-A8DF1A0DE359}" type="datetime1">
               <a:rPr lang="en-US" smtClean="0"/>
-              <a:t>10/21/2020</a:t>
+              <a:t>10/24/2020</a:t>
             </a:fld>
             <a:endParaRPr lang="en-US" dirty="0"/>
           </a:p>
@@ -5423,7 +5423,7 @@
             </a:r>
             <a:r>
               <a:rPr lang="es-419" b="1" dirty="0"/>
-              <a:t> Semana 6 </a:t>
+              <a:t> Semana 7 </a:t>
             </a:r>
           </a:p>
         </p:txBody>
@@ -5681,7 +5681,7 @@
                   <a:schemeClr val="tx1"/>
                 </a:solidFill>
               </a:rPr>
-              <a:t>Historia iniciadas: 17</a:t>
+              <a:t>Historia iniciadas: 19</a:t>
             </a:r>
           </a:p>
           <a:p>
@@ -5971,7 +5971,7 @@
             </a:pPr>
             <a:r>
               <a:rPr lang="es-419" dirty="0"/>
-              <a:t>Historias totales: 25</a:t>
+              <a:t>Historias totales: 27</a:t>
             </a:r>
           </a:p>
           <a:p>
@@ -5981,7 +5981,7 @@
             </a:pPr>
             <a:r>
               <a:rPr lang="es-419" dirty="0"/>
-              <a:t>Puntaje total: 121pts</a:t>
+              <a:t>Puntaje total: 127pts</a:t>
             </a:r>
           </a:p>
           <a:p>
@@ -7194,7 +7194,7 @@
             <a:pPr algn="ctr"/>
             <a:r>
               <a:rPr lang="es-MX" dirty="0"/>
-              <a:t>7</a:t>
+              <a:t>13</a:t>
             </a:r>
             <a:endParaRPr lang="es-CL" dirty="0"/>
           </a:p>
@@ -7214,7 +7214,7 @@
         </p:nvSpPr>
         <p:spPr>
           <a:xfrm>
-            <a:off x="0" y="5809204"/>
+            <a:off x="22098" y="4722832"/>
             <a:ext cx="689289" cy="436596"/>
           </a:xfrm>
           <a:prstGeom prst="rightArrow">
@@ -7244,7 +7244,7 @@
             <a:pPr algn="ctr"/>
             <a:r>
               <a:rPr lang="es-MX" dirty="0"/>
-              <a:t>0</a:t>
+              <a:t>7</a:t>
             </a:r>
             <a:endParaRPr lang="es-CL" dirty="0"/>
           </a:p>
@@ -7264,7 +7264,7 @@
         </p:nvSpPr>
         <p:spPr>
           <a:xfrm>
-            <a:off x="3219440" y="2176157"/>
+            <a:off x="5012729" y="2176157"/>
             <a:ext cx="1647426" cy="726077"/>
           </a:xfrm>
           <a:prstGeom prst="roundRect">
@@ -7331,7 +7331,7 @@
         </p:nvSpPr>
         <p:spPr>
           <a:xfrm>
-            <a:off x="3219440" y="3008066"/>
+            <a:off x="5012729" y="3008066"/>
             <a:ext cx="1647426" cy="726077"/>
           </a:xfrm>
           <a:prstGeom prst="roundRect">
@@ -7398,7 +7398,7 @@
         </p:nvSpPr>
         <p:spPr>
           <a:xfrm>
-            <a:off x="3219440" y="3904123"/>
+            <a:off x="5012729" y="3904123"/>
             <a:ext cx="1647426" cy="726077"/>
           </a:xfrm>
           <a:prstGeom prst="roundRect">
@@ -7439,6 +7439,140 @@
                 </a:solidFill>
               </a:rPr>
               <a:t>(2) Luego de crear el comentario debe aparecer el autor del comentario.</a:t>
+            </a:r>
+            <a:endParaRPr lang="es-419" sz="800" dirty="0">
+              <a:solidFill>
+                <a:schemeClr val="tx1"/>
+              </a:solidFill>
+            </a:endParaRPr>
+          </a:p>
+        </p:txBody>
+      </p:sp>
+      <p:sp>
+        <p:nvSpPr>
+          <p:cNvPr id="16" name="Rectángulo redondeado 13">
+            <a:extLst>
+              <a:ext uri="{FF2B5EF4-FFF2-40B4-BE49-F238E27FC236}">
+                <a16:creationId xmlns:a16="http://schemas.microsoft.com/office/drawing/2014/main" id="{5BB9D54F-1859-47D2-B4B3-8C955049735D}"/>
+              </a:ext>
+            </a:extLst>
+          </p:cNvPr>
+          <p:cNvSpPr/>
+          <p:nvPr/>
+        </p:nvSpPr>
+        <p:spPr>
+          <a:xfrm>
+            <a:off x="3130355" y="3914963"/>
+            <a:ext cx="1647426" cy="726077"/>
+          </a:xfrm>
+          <a:prstGeom prst="roundRect">
+            <a:avLst/>
+          </a:prstGeom>
+          <a:solidFill>
+            <a:schemeClr val="accent6">
+              <a:lumMod val="60000"/>
+              <a:lumOff val="40000"/>
+            </a:schemeClr>
+          </a:solidFill>
+        </p:spPr>
+        <p:style>
+          <a:lnRef idx="2">
+            <a:schemeClr val="accent1">
+              <a:shade val="50000"/>
+            </a:schemeClr>
+          </a:lnRef>
+          <a:fillRef idx="1">
+            <a:schemeClr val="accent1"/>
+          </a:fillRef>
+          <a:effectRef idx="0">
+            <a:schemeClr val="accent1"/>
+          </a:effectRef>
+          <a:fontRef idx="minor">
+            <a:schemeClr val="lt1"/>
+          </a:fontRef>
+        </p:style>
+        <p:txBody>
+          <a:bodyPr rtlCol="0" anchor="ctr"/>
+          <a:lstStyle/>
+          <a:p>
+            <a:pPr marL="285750" indent="-285750">
+              <a:buFont typeface="Arial" panose="020B0604020202020204" pitchFamily="34" charset="0"/>
+              <a:buChar char="•"/>
+            </a:pPr>
+            <a:r>
+              <a:rPr lang="es-MX" sz="800" dirty="0">
+                <a:solidFill>
+                  <a:schemeClr val="tx1"/>
+                </a:solidFill>
+              </a:rPr>
+              <a:t>(3) Como administrador al momento de crear una noticia quiero vincularla a una carrera</a:t>
+            </a:r>
+            <a:endParaRPr lang="es-419" sz="800" dirty="0">
+              <a:solidFill>
+                <a:schemeClr val="tx1"/>
+              </a:solidFill>
+            </a:endParaRPr>
+          </a:p>
+        </p:txBody>
+      </p:sp>
+      <p:sp>
+        <p:nvSpPr>
+          <p:cNvPr id="17" name="Rectángulo redondeado 13">
+            <a:extLst>
+              <a:ext uri="{FF2B5EF4-FFF2-40B4-BE49-F238E27FC236}">
+                <a16:creationId xmlns:a16="http://schemas.microsoft.com/office/drawing/2014/main" id="{618043A4-30CA-4661-B94D-152E0A324F0B}"/>
+              </a:ext>
+            </a:extLst>
+          </p:cNvPr>
+          <p:cNvSpPr/>
+          <p:nvPr/>
+        </p:nvSpPr>
+        <p:spPr>
+          <a:xfrm>
+            <a:off x="3130355" y="4889863"/>
+            <a:ext cx="1647426" cy="726077"/>
+          </a:xfrm>
+          <a:prstGeom prst="roundRect">
+            <a:avLst/>
+          </a:prstGeom>
+          <a:solidFill>
+            <a:schemeClr val="accent6">
+              <a:lumMod val="60000"/>
+              <a:lumOff val="40000"/>
+            </a:schemeClr>
+          </a:solidFill>
+        </p:spPr>
+        <p:style>
+          <a:lnRef idx="2">
+            <a:schemeClr val="accent1">
+              <a:shade val="50000"/>
+            </a:schemeClr>
+          </a:lnRef>
+          <a:fillRef idx="1">
+            <a:schemeClr val="accent1"/>
+          </a:fillRef>
+          <a:effectRef idx="0">
+            <a:schemeClr val="accent1"/>
+          </a:effectRef>
+          <a:fontRef idx="minor">
+            <a:schemeClr val="lt1"/>
+          </a:fontRef>
+        </p:style>
+        <p:txBody>
+          <a:bodyPr rtlCol="0" anchor="ctr"/>
+          <a:lstStyle/>
+          <a:p>
+            <a:pPr marL="285750" indent="-285750">
+              <a:buFont typeface="Arial" panose="020B0604020202020204" pitchFamily="34" charset="0"/>
+              <a:buChar char="•"/>
+            </a:pPr>
+            <a:r>
+              <a:rPr lang="es-MX" sz="800" dirty="0">
+                <a:solidFill>
+                  <a:schemeClr val="tx1"/>
+                </a:solidFill>
+              </a:rPr>
+              <a:t>(3) Como administrador quiero crear carreras para poder vincular noticias</a:t>
             </a:r>
             <a:endParaRPr lang="es-419" sz="800" dirty="0">
               <a:solidFill>

</xml_diff>

<commit_message>
Modificacion PPT semana 9
</commit_message>
<xml_diff>
--- a/Monitoreo_Proyecto.pptx
+++ b/Monitoreo_Proyecto.pptx
@@ -230,7 +230,7 @@
           <a:p>
             <a:fld id="{EC13577B-6902-467D-A26C-08A0DD5E4E03}" type="datetimeFigureOut">
               <a:rPr lang="en-US" smtClean="0"/>
-              <a:t>11/4/2020</a:t>
+              <a:t>11/12/2020</a:t>
             </a:fld>
             <a:endParaRPr lang="en-US" dirty="0"/>
           </a:p>
@@ -793,7 +793,7 @@
           <a:p>
             <a:fld id="{04AD7083-2812-4336-A862-6CB4E9DAA666}" type="datetime1">
               <a:rPr lang="en-US" smtClean="0"/>
-              <a:t>11/4/2020</a:t>
+              <a:t>11/12/2020</a:t>
             </a:fld>
             <a:endParaRPr lang="en-US" dirty="0"/>
           </a:p>
@@ -1070,7 +1070,7 @@
           <a:p>
             <a:fld id="{F426DB13-0979-4AFD-BE5D-BA943E81C2FF}" type="datetime1">
               <a:rPr lang="en-US" smtClean="0"/>
-              <a:t>11/4/2020</a:t>
+              <a:t>11/12/2020</a:t>
             </a:fld>
             <a:endParaRPr lang="en-US" dirty="0"/>
           </a:p>
@@ -1352,7 +1352,7 @@
           <a:p>
             <a:fld id="{ACA095C1-F76B-4592-A3BF-48B4D1BF64A5}" type="datetime1">
               <a:rPr lang="en-US" smtClean="0"/>
-              <a:t>11/4/2020</a:t>
+              <a:t>11/12/2020</a:t>
             </a:fld>
             <a:endParaRPr lang="en-US" dirty="0"/>
           </a:p>
@@ -1713,7 +1713,7 @@
           <a:p>
             <a:fld id="{F68BAF15-D946-438F-BA57-43A568DB52D7}" type="datetime1">
               <a:rPr lang="en-US" smtClean="0"/>
-              <a:t>11/4/2020</a:t>
+              <a:t>11/12/2020</a:t>
             </a:fld>
             <a:endParaRPr lang="en-US" dirty="0"/>
           </a:p>
@@ -2013,7 +2013,7 @@
           <a:p>
             <a:fld id="{635A5B98-0E43-43A4-8C2A-E00A6A883A04}" type="datetime1">
               <a:rPr lang="en-US" smtClean="0"/>
-              <a:t>11/4/2020</a:t>
+              <a:t>11/12/2020</a:t>
             </a:fld>
             <a:endParaRPr lang="en-US" dirty="0"/>
           </a:p>
@@ -2528,7 +2528,7 @@
           <a:p>
             <a:fld id="{45FB536E-04DA-42C8-BC01-49FDB8623C5B}" type="datetime1">
               <a:rPr lang="en-US" smtClean="0"/>
-              <a:t>11/4/2020</a:t>
+              <a:t>11/12/2020</a:t>
             </a:fld>
             <a:endParaRPr lang="en-US" dirty="0"/>
           </a:p>
@@ -3173,7 +3173,7 @@
           <a:p>
             <a:fld id="{EE38660A-ACB5-4EAE-A29D-584DB55BAC5B}" type="datetime1">
               <a:rPr lang="en-US" smtClean="0"/>
-              <a:t>11/4/2020</a:t>
+              <a:t>11/12/2020</a:t>
             </a:fld>
             <a:endParaRPr lang="en-US" dirty="0"/>
           </a:p>
@@ -3398,7 +3398,7 @@
           <a:p>
             <a:fld id="{68130BA2-7F47-4355-A40B-1D4E78D026D1}" type="datetime1">
               <a:rPr lang="en-US" smtClean="0"/>
-              <a:t>11/4/2020</a:t>
+              <a:t>11/12/2020</a:t>
             </a:fld>
             <a:endParaRPr lang="en-US" dirty="0"/>
           </a:p>
@@ -3539,7 +3539,7 @@
           <a:p>
             <a:fld id="{0C7FF9F2-B4E6-461D-80C5-31D1DFDBE4F3}" type="datetime1">
               <a:rPr lang="en-US" smtClean="0"/>
-              <a:t>11/4/2020</a:t>
+              <a:t>11/12/2020</a:t>
             </a:fld>
             <a:endParaRPr lang="en-US" dirty="0"/>
           </a:p>
@@ -3876,7 +3876,7 @@
           <a:p>
             <a:fld id="{338DC08D-1485-4CDD-BD12-A2AAA137B289}" type="datetime1">
               <a:rPr lang="en-US" smtClean="0"/>
-              <a:t>11/4/2020</a:t>
+              <a:t>11/12/2020</a:t>
             </a:fld>
             <a:endParaRPr lang="en-US" dirty="0"/>
           </a:p>
@@ -4133,7 +4133,7 @@
           <a:p>
             <a:fld id="{13D2B1DD-5C24-46B3-BEAE-43189A8FCAFF}" type="datetime1">
               <a:rPr lang="en-US" smtClean="0"/>
-              <a:t>11/4/2020</a:t>
+              <a:t>11/12/2020</a:t>
             </a:fld>
             <a:endParaRPr lang="en-US" dirty="0"/>
           </a:p>
@@ -4346,7 +4346,7 @@
           <a:p>
             <a:fld id="{565BA3BC-6560-4C09-A047-A8DF1A0DE359}" type="datetime1">
               <a:rPr lang="en-US" smtClean="0"/>
-              <a:t>11/4/2020</a:t>
+              <a:t>11/12/2020</a:t>
             </a:fld>
             <a:endParaRPr lang="en-US" dirty="0"/>
           </a:p>
@@ -5423,7 +5423,7 @@
             </a:r>
             <a:r>
               <a:rPr lang="es-419" b="1" dirty="0"/>
-              <a:t> Semana 8 </a:t>
+              <a:t> Semana 9 </a:t>
             </a:r>
           </a:p>
         </p:txBody>
@@ -7329,7 +7329,7 @@
             <a:pPr algn="ctr"/>
             <a:r>
               <a:rPr lang="es-MX" dirty="0"/>
-              <a:t>13</a:t>
+              <a:t>60</a:t>
             </a:r>
             <a:endParaRPr lang="es-CL" dirty="0"/>
           </a:p>
@@ -7399,8 +7399,8 @@
         </p:nvSpPr>
         <p:spPr>
           <a:xfrm>
-            <a:off x="7253487" y="1424485"/>
-            <a:ext cx="1647426" cy="726077"/>
+            <a:off x="961786" y="1704840"/>
+            <a:ext cx="1906403" cy="1030838"/>
           </a:xfrm>
           <a:prstGeom prst="roundRect">
             <a:avLst/>
@@ -7437,12 +7437,20 @@
               <a:buChar char="•"/>
             </a:pPr>
             <a:r>
+              <a:rPr lang="es-CL" sz="800" dirty="0">
+                <a:solidFill>
+                  <a:schemeClr val="tx1"/>
+                </a:solidFill>
+              </a:rPr>
+              <a:t>(40)Yo como desarrollador necesito hacer una prueba de implementación de la API de seguridad Microsoft para integrarla con el sistema</a:t>
+            </a:r>
+            <a:r>
               <a:rPr lang="es-MX" sz="800" dirty="0">
                 <a:solidFill>
                   <a:schemeClr val="tx1"/>
                 </a:solidFill>
               </a:rPr>
-              <a:t>(2)Como usuario quiero comentar en el post para añadir un comentario.</a:t>
+              <a:t>.</a:t>
             </a:r>
             <a:endParaRPr lang="es-419" sz="800" dirty="0">
               <a:solidFill>
@@ -7454,10 +7462,10 @@
       </p:sp>
       <p:sp>
         <p:nvSpPr>
-          <p:cNvPr id="39" name="Rectángulo redondeado 13">
+          <p:cNvPr id="3" name="Rectángulo redondeado 13">
             <a:extLst>
               <a:ext uri="{FF2B5EF4-FFF2-40B4-BE49-F238E27FC236}">
-                <a16:creationId xmlns:a16="http://schemas.microsoft.com/office/drawing/2014/main" id="{8A8884F0-48EB-40BE-9702-EA9C8C5BE7F3}"/>
+                <a16:creationId xmlns:a16="http://schemas.microsoft.com/office/drawing/2014/main" id="{87361461-2B48-49E8-8670-E89EC7311572}"/>
               </a:ext>
             </a:extLst>
           </p:cNvPr>
@@ -7466,8 +7474,8 @@
         </p:nvSpPr>
         <p:spPr>
           <a:xfrm>
-            <a:off x="7253487" y="2256394"/>
-            <a:ext cx="1647426" cy="726077"/>
+            <a:off x="961785" y="2913581"/>
+            <a:ext cx="1906403" cy="1030838"/>
           </a:xfrm>
           <a:prstGeom prst="roundRect">
             <a:avLst/>
@@ -7504,210 +7512,12 @@
               <a:buChar char="•"/>
             </a:pPr>
             <a:r>
-              <a:rPr lang="es-MX" sz="800" dirty="0">
+              <a:rPr lang="es-CL" sz="800" dirty="0">
                 <a:solidFill>
                   <a:schemeClr val="tx1"/>
                 </a:solidFill>
               </a:rPr>
-              <a:t>(3)Como usuario quiero escribir para poder dejar mi comentario.</a:t>
-            </a:r>
-            <a:endParaRPr lang="es-419" sz="800" dirty="0">
-              <a:solidFill>
-                <a:schemeClr val="tx1"/>
-              </a:solidFill>
-            </a:endParaRPr>
-          </a:p>
-        </p:txBody>
-      </p:sp>
-      <p:sp>
-        <p:nvSpPr>
-          <p:cNvPr id="41" name="Rectángulo redondeado 13">
-            <a:extLst>
-              <a:ext uri="{FF2B5EF4-FFF2-40B4-BE49-F238E27FC236}">
-                <a16:creationId xmlns:a16="http://schemas.microsoft.com/office/drawing/2014/main" id="{705BEC6B-D1C8-4960-AF13-E03CDB402FD2}"/>
-              </a:ext>
-            </a:extLst>
-          </p:cNvPr>
-          <p:cNvSpPr/>
-          <p:nvPr/>
-        </p:nvSpPr>
-        <p:spPr>
-          <a:xfrm>
-            <a:off x="7253487" y="3152451"/>
-            <a:ext cx="1647426" cy="726077"/>
-          </a:xfrm>
-          <a:prstGeom prst="roundRect">
-            <a:avLst/>
-          </a:prstGeom>
-          <a:solidFill>
-            <a:srgbClr val="CC66FF"/>
-          </a:solidFill>
-        </p:spPr>
-        <p:style>
-          <a:lnRef idx="2">
-            <a:schemeClr val="accent1">
-              <a:shade val="50000"/>
-            </a:schemeClr>
-          </a:lnRef>
-          <a:fillRef idx="1">
-            <a:schemeClr val="accent1"/>
-          </a:fillRef>
-          <a:effectRef idx="0">
-            <a:schemeClr val="accent1"/>
-          </a:effectRef>
-          <a:fontRef idx="minor">
-            <a:schemeClr val="lt1"/>
-          </a:fontRef>
-        </p:style>
-        <p:txBody>
-          <a:bodyPr rtlCol="0" anchor="ctr"/>
-          <a:lstStyle/>
-          <a:p>
-            <a:pPr marL="285750" indent="-285750">
-              <a:buFont typeface="Arial" panose="020B0604020202020204" pitchFamily="34" charset="0"/>
-              <a:buChar char="•"/>
-            </a:pPr>
-            <a:r>
-              <a:rPr lang="es-MX" sz="800" dirty="0">
-                <a:solidFill>
-                  <a:schemeClr val="tx1"/>
-                </a:solidFill>
-              </a:rPr>
-              <a:t>(2) Luego de crear el comentario debe aparecer el autor del comentario.</a:t>
-            </a:r>
-            <a:endParaRPr lang="es-419" sz="800" dirty="0">
-              <a:solidFill>
-                <a:schemeClr val="tx1"/>
-              </a:solidFill>
-            </a:endParaRPr>
-          </a:p>
-        </p:txBody>
-      </p:sp>
-      <p:sp>
-        <p:nvSpPr>
-          <p:cNvPr id="16" name="Rectángulo redondeado 13">
-            <a:extLst>
-              <a:ext uri="{FF2B5EF4-FFF2-40B4-BE49-F238E27FC236}">
-                <a16:creationId xmlns:a16="http://schemas.microsoft.com/office/drawing/2014/main" id="{5BB9D54F-1859-47D2-B4B3-8C955049735D}"/>
-              </a:ext>
-            </a:extLst>
-          </p:cNvPr>
-          <p:cNvSpPr/>
-          <p:nvPr/>
-        </p:nvSpPr>
-        <p:spPr>
-          <a:xfrm>
-            <a:off x="7253487" y="3996755"/>
-            <a:ext cx="1647426" cy="726077"/>
-          </a:xfrm>
-          <a:prstGeom prst="roundRect">
-            <a:avLst/>
-          </a:prstGeom>
-          <a:solidFill>
-            <a:schemeClr val="accent6">
-              <a:lumMod val="60000"/>
-              <a:lumOff val="40000"/>
-            </a:schemeClr>
-          </a:solidFill>
-        </p:spPr>
-        <p:style>
-          <a:lnRef idx="2">
-            <a:schemeClr val="accent1">
-              <a:shade val="50000"/>
-            </a:schemeClr>
-          </a:lnRef>
-          <a:fillRef idx="1">
-            <a:schemeClr val="accent1"/>
-          </a:fillRef>
-          <a:effectRef idx="0">
-            <a:schemeClr val="accent1"/>
-          </a:effectRef>
-          <a:fontRef idx="minor">
-            <a:schemeClr val="lt1"/>
-          </a:fontRef>
-        </p:style>
-        <p:txBody>
-          <a:bodyPr rtlCol="0" anchor="ctr"/>
-          <a:lstStyle/>
-          <a:p>
-            <a:pPr marL="285750" indent="-285750">
-              <a:buFont typeface="Arial" panose="020B0604020202020204" pitchFamily="34" charset="0"/>
-              <a:buChar char="•"/>
-            </a:pPr>
-            <a:r>
-              <a:rPr lang="es-MX" sz="800" dirty="0">
-                <a:solidFill>
-                  <a:schemeClr val="tx1"/>
-                </a:solidFill>
-              </a:rPr>
-              <a:t>(3) Como administrador al momento de crear una noticia quiero vincularla a una carrera</a:t>
-            </a:r>
-            <a:endParaRPr lang="es-419" sz="800" dirty="0">
-              <a:solidFill>
-                <a:schemeClr val="tx1"/>
-              </a:solidFill>
-            </a:endParaRPr>
-          </a:p>
-        </p:txBody>
-      </p:sp>
-      <p:sp>
-        <p:nvSpPr>
-          <p:cNvPr id="17" name="Rectángulo redondeado 13">
-            <a:extLst>
-              <a:ext uri="{FF2B5EF4-FFF2-40B4-BE49-F238E27FC236}">
-                <a16:creationId xmlns:a16="http://schemas.microsoft.com/office/drawing/2014/main" id="{618043A4-30CA-4661-B94D-152E0A324F0B}"/>
-              </a:ext>
-            </a:extLst>
-          </p:cNvPr>
-          <p:cNvSpPr/>
-          <p:nvPr/>
-        </p:nvSpPr>
-        <p:spPr>
-          <a:xfrm>
-            <a:off x="7253487" y="4971655"/>
-            <a:ext cx="1647426" cy="726077"/>
-          </a:xfrm>
-          <a:prstGeom prst="roundRect">
-            <a:avLst/>
-          </a:prstGeom>
-          <a:solidFill>
-            <a:schemeClr val="accent6">
-              <a:lumMod val="60000"/>
-              <a:lumOff val="40000"/>
-            </a:schemeClr>
-          </a:solidFill>
-        </p:spPr>
-        <p:style>
-          <a:lnRef idx="2">
-            <a:schemeClr val="accent1">
-              <a:shade val="50000"/>
-            </a:schemeClr>
-          </a:lnRef>
-          <a:fillRef idx="1">
-            <a:schemeClr val="accent1"/>
-          </a:fillRef>
-          <a:effectRef idx="0">
-            <a:schemeClr val="accent1"/>
-          </a:effectRef>
-          <a:fontRef idx="minor">
-            <a:schemeClr val="lt1"/>
-          </a:fontRef>
-        </p:style>
-        <p:txBody>
-          <a:bodyPr rtlCol="0" anchor="ctr"/>
-          <a:lstStyle/>
-          <a:p>
-            <a:pPr marL="285750" indent="-285750">
-              <a:buFont typeface="Arial" panose="020B0604020202020204" pitchFamily="34" charset="0"/>
-              <a:buChar char="•"/>
-            </a:pPr>
-            <a:r>
-              <a:rPr lang="es-MX" sz="800" dirty="0">
-                <a:solidFill>
-                  <a:schemeClr val="tx1"/>
-                </a:solidFill>
-              </a:rPr>
-              <a:t>(3) Como administrador quiero crear carreras para poder vincular noticias</a:t>
+              <a:t>(20)Yo como desarrollador necesito aprender como funciona la API de Microsoft para poder integrarlo</a:t>
             </a:r>
             <a:endParaRPr lang="es-419" sz="800" dirty="0">
               <a:solidFill>

</xml_diff>